<commit_message>
finished challenges, backgrounds, conclusion, references
</commit_message>
<xml_diff>
--- a/poster/finalPoster.pptx
+++ b/poster/finalPoster.pptx
@@ -695,6 +695,91 @@
     </a:lvl9pPr>
   </p:notesStyle>
 </p:notesMaster>
+</file>
+
+<file path=ppt/notesSlides/notesSlide1.xml><?xml version="1.0" encoding="utf-8"?>
+<p:notes xmlns:a="http://schemas.openxmlformats.org/drawingml/2006/main" xmlns:r="http://schemas.openxmlformats.org/officeDocument/2006/relationships" xmlns:p="http://schemas.openxmlformats.org/presentationml/2006/main">
+  <p:cSld>
+    <p:spTree>
+      <p:nvGrpSpPr>
+        <p:cNvPr id="1" name=""/>
+        <p:cNvGrpSpPr/>
+        <p:nvPr/>
+      </p:nvGrpSpPr>
+      <p:grpSpPr>
+        <a:xfrm>
+          <a:off x="0" y="0"/>
+          <a:ext cx="0" cy="0"/>
+          <a:chOff x="0" y="0"/>
+          <a:chExt cx="0" cy="0"/>
+        </a:xfrm>
+      </p:grpSpPr>
+      <p:sp>
+        <p:nvSpPr>
+          <p:cNvPr id="2" name="Slide Image Placeholder 1"/>
+          <p:cNvSpPr>
+            <a:spLocks noGrp="1" noRot="1" noChangeAspect="1"/>
+          </p:cNvSpPr>
+          <p:nvPr>
+            <p:ph type="sldImg"/>
+          </p:nvPr>
+        </p:nvSpPr>
+        <p:spPr/>
+      </p:sp>
+      <p:sp>
+        <p:nvSpPr>
+          <p:cNvPr id="3" name="Notes Placeholder 2"/>
+          <p:cNvSpPr>
+            <a:spLocks noGrp="1"/>
+          </p:cNvSpPr>
+          <p:nvPr>
+            <p:ph type="body" idx="1"/>
+          </p:nvPr>
+        </p:nvSpPr>
+        <p:spPr/>
+        <p:txBody>
+          <a:bodyPr/>
+          <a:lstStyle/>
+          <a:p>
+            <a:endParaRPr lang="en-US" dirty="0"/>
+          </a:p>
+        </p:txBody>
+      </p:sp>
+      <p:sp>
+        <p:nvSpPr>
+          <p:cNvPr id="4" name="Slide Number Placeholder 3"/>
+          <p:cNvSpPr>
+            <a:spLocks noGrp="1"/>
+          </p:cNvSpPr>
+          <p:nvPr>
+            <p:ph type="sldNum" sz="quarter" idx="5"/>
+          </p:nvPr>
+        </p:nvSpPr>
+        <p:spPr/>
+        <p:txBody>
+          <a:bodyPr/>
+          <a:lstStyle/>
+          <a:p>
+            <a:fld id="{26A1A87D-CAF7-4BDC-A0D3-C0DBEDE81619}" type="slidenum">
+              <a:rPr lang="en-US" smtClean="0"/>
+              <a:pPr/>
+              <a:t>1</a:t>
+            </a:fld>
+            <a:endParaRPr lang="en-US" dirty="0"/>
+          </a:p>
+        </p:txBody>
+      </p:sp>
+    </p:spTree>
+    <p:extLst>
+      <p:ext uri="{BB962C8B-B14F-4D97-AF65-F5344CB8AC3E}">
+        <p14:creationId xmlns:p14="http://schemas.microsoft.com/office/powerpoint/2010/main" val="1438007874"/>
+      </p:ext>
+    </p:extLst>
+  </p:cSld>
+  <p:clrMapOvr>
+    <a:masterClrMapping/>
+  </p:clrMapOvr>
+</p:notes>
 </file>
 
 <file path=ppt/slideLayouts/slideLayout1.xml><?xml version="1.0" encoding="utf-8"?>
@@ -2084,12 +2169,17 @@
             <p:ph type="body" sz="quarter" idx="10"/>
           </p:nvPr>
         </p:nvSpPr>
-        <p:spPr/>
+        <p:spPr>
+          <a:xfrm>
+            <a:off x="459674" y="5438681"/>
+            <a:ext cx="10056813" cy="8047952"/>
+          </a:xfrm>
+        </p:spPr>
         <p:txBody>
           <a:bodyPr/>
           <a:lstStyle/>
           <a:p>
-            <a:endParaRPr lang="en-US">
+            <a:endParaRPr lang="en-US" dirty="0">
               <a:solidFill>
                 <a:schemeClr val="tx1"/>
               </a:solidFill>
@@ -2110,7 +2200,7 @@
         </p:nvSpPr>
         <p:spPr>
           <a:xfrm>
-            <a:off x="477827" y="5371778"/>
+            <a:off x="477827" y="4431978"/>
             <a:ext cx="10048875" cy="1107988"/>
           </a:xfrm>
         </p:spPr>
@@ -2121,7 +2211,7 @@
             <a:r>
               <a:rPr lang="en-US" sz="6000" u="none" dirty="0">
                 <a:solidFill>
-                  <a:schemeClr val="tx1"/>
+                  <a:srgbClr val="02326D"/>
                 </a:solidFill>
                 <a:latin typeface="Comfortaa" panose="020F0403060000060003" pitchFamily="34" charset="0"/>
               </a:rPr>
@@ -2142,7 +2232,7 @@
         </p:nvSpPr>
         <p:spPr>
           <a:xfrm>
-            <a:off x="477825" y="14035542"/>
+            <a:off x="477825" y="13603742"/>
             <a:ext cx="10050462" cy="1107988"/>
           </a:xfrm>
         </p:spPr>
@@ -2153,11 +2243,11 @@
             <a:r>
               <a:rPr lang="en-US" sz="6000" u="none" dirty="0">
                 <a:solidFill>
-                  <a:schemeClr val="tx1"/>
-                </a:solidFill>
-                <a:latin typeface="Comfortaa" panose="020F0403060000060003" pitchFamily="34" charset="0"/>
-              </a:rPr>
-              <a:t>Introduction</a:t>
+                  <a:srgbClr val="02326D"/>
+                </a:solidFill>
+                <a:latin typeface="Comfortaa" panose="020F0403060000060003" pitchFamily="34" charset="0"/>
+              </a:rPr>
+              <a:t>Background</a:t>
             </a:r>
           </a:p>
         </p:txBody>
@@ -2174,7 +2264,7 @@
         </p:nvSpPr>
         <p:spPr>
           <a:xfrm>
-            <a:off x="11460162" y="5371779"/>
+            <a:off x="11460162" y="4431979"/>
             <a:ext cx="10048875" cy="1107988"/>
           </a:xfrm>
         </p:spPr>
@@ -2185,7 +2275,7 @@
             <a:r>
               <a:rPr lang="en-US" sz="6000" u="none" dirty="0">
                 <a:solidFill>
-                  <a:schemeClr val="tx1"/>
+                  <a:srgbClr val="02326D"/>
                 </a:solidFill>
                 <a:latin typeface="Comfortaa" panose="020F0403060000060003" pitchFamily="34" charset="0"/>
               </a:rPr>
@@ -2206,7 +2296,7 @@
         </p:nvSpPr>
         <p:spPr>
           <a:xfrm>
-            <a:off x="22377404" y="5371778"/>
+            <a:off x="22377404" y="4431978"/>
             <a:ext cx="10058400" cy="1107988"/>
           </a:xfrm>
         </p:spPr>
@@ -2217,11 +2307,11 @@
             <a:r>
               <a:rPr lang="en-US" sz="6000" u="none" dirty="0">
                 <a:solidFill>
-                  <a:schemeClr val="tx1"/>
-                </a:solidFill>
-                <a:latin typeface="Comfortaa" panose="020F0403060000060003" pitchFamily="34" charset="0"/>
-              </a:rPr>
-              <a:t>Results</a:t>
+                  <a:srgbClr val="02326D"/>
+                </a:solidFill>
+                <a:latin typeface="Comfortaa" panose="020F0403060000060003" pitchFamily="34" charset="0"/>
+              </a:rPr>
+              <a:t>Results and Optimizations</a:t>
             </a:r>
           </a:p>
         </p:txBody>
@@ -2238,7 +2328,7 @@
         </p:nvSpPr>
         <p:spPr>
           <a:xfrm>
-            <a:off x="33390292" y="5371778"/>
+            <a:off x="33390292" y="4431978"/>
             <a:ext cx="10047018" cy="1107988"/>
           </a:xfrm>
         </p:spPr>
@@ -2249,11 +2339,11 @@
             <a:r>
               <a:rPr lang="en-US" sz="6000" u="none" dirty="0">
                 <a:solidFill>
-                  <a:schemeClr val="tx1"/>
-                </a:solidFill>
-                <a:latin typeface="Comfortaa" panose="020F0403060000060003" pitchFamily="34" charset="0"/>
-              </a:rPr>
-              <a:t>Conclusion</a:t>
+                  <a:srgbClr val="02326D"/>
+                </a:solidFill>
+                <a:latin typeface="Comfortaa" panose="020F0403060000060003" pitchFamily="34" charset="0"/>
+              </a:rPr>
+              <a:t>Challenges Faced</a:t>
             </a:r>
           </a:p>
         </p:txBody>
@@ -2268,17 +2358,119 @@
             <p:ph type="body" sz="quarter" idx="26"/>
           </p:nvPr>
         </p:nvSpPr>
-        <p:spPr/>
+        <p:spPr>
+          <a:xfrm>
+            <a:off x="33390292" y="5438681"/>
+            <a:ext cx="10047018" cy="8402278"/>
+          </a:xfrm>
+        </p:spPr>
         <p:txBody>
           <a:bodyPr/>
           <a:lstStyle/>
           <a:p>
-            <a:endParaRPr lang="en-US">
-              <a:solidFill>
-                <a:schemeClr val="tx1"/>
-              </a:solidFill>
-              <a:latin typeface="Comfortaa" panose="020F0403060000060003" pitchFamily="34" charset="0"/>
-            </a:endParaRPr>
+            <a:pPr marL="342900" indent="-342900">
+              <a:buFont typeface="Arial" panose="020B0604020202020204" pitchFamily="34" charset="0"/>
+              <a:buChar char="•"/>
+            </a:pPr>
+            <a:r>
+              <a:rPr lang="en-US" sz="3000" dirty="0">
+                <a:solidFill>
+                  <a:schemeClr val="tx1"/>
+                </a:solidFill>
+                <a:latin typeface="Comfortaa" panose="020F0403060000060003" pitchFamily="34" charset="0"/>
+              </a:rPr>
+              <a:t>MIDI files are hard to parse and missing important information – key signature, rhythm, etc.</a:t>
+            </a:r>
+          </a:p>
+          <a:p>
+            <a:pPr marL="342900" indent="-342900">
+              <a:buFont typeface="Arial" panose="020B0604020202020204" pitchFamily="34" charset="0"/>
+              <a:buChar char="•"/>
+            </a:pPr>
+            <a:r>
+              <a:rPr lang="en-US" sz="3000" dirty="0">
+                <a:solidFill>
+                  <a:schemeClr val="tx1"/>
+                </a:solidFill>
+                <a:latin typeface="Comfortaa" panose="020F0403060000060003" pitchFamily="34" charset="0"/>
+              </a:rPr>
+              <a:t>Required pre-processing and re-formatting of input MIDI files into a usable text file</a:t>
+            </a:r>
+          </a:p>
+          <a:p>
+            <a:pPr marL="342900" indent="-342900">
+              <a:buFont typeface="Arial" panose="020B0604020202020204" pitchFamily="34" charset="0"/>
+              <a:buChar char="•"/>
+            </a:pPr>
+            <a:r>
+              <a:rPr lang="en-US" sz="3000" dirty="0">
+                <a:solidFill>
+                  <a:schemeClr val="tx1"/>
+                </a:solidFill>
+                <a:latin typeface="Comfortaa" panose="020F0403060000060003" pitchFamily="34" charset="0"/>
+              </a:rPr>
+              <a:t>Pre-processing and server algorithms required use of multiple programming languages and techniques</a:t>
+            </a:r>
+          </a:p>
+          <a:p>
+            <a:pPr marL="342900" indent="-342900">
+              <a:buFont typeface="Arial" panose="020B0604020202020204" pitchFamily="34" charset="0"/>
+              <a:buChar char="•"/>
+            </a:pPr>
+            <a:r>
+              <a:rPr lang="en-US" sz="3000" dirty="0">
+                <a:solidFill>
+                  <a:schemeClr val="tx1"/>
+                </a:solidFill>
+                <a:latin typeface="Comfortaa" panose="020F0403060000060003" pitchFamily="34" charset="0"/>
+              </a:rPr>
+              <a:t>Balance of size in probability matrices - Larger matrices mean more detailed probabilities, better sounding music, but take up a lot of storage</a:t>
+            </a:r>
+          </a:p>
+          <a:p>
+            <a:pPr marL="342900" indent="-342900">
+              <a:buFont typeface="Arial" panose="020B0604020202020204" pitchFamily="34" charset="0"/>
+              <a:buChar char="•"/>
+            </a:pPr>
+            <a:r>
+              <a:rPr lang="en-US" sz="3000" dirty="0">
+                <a:solidFill>
+                  <a:schemeClr val="tx1"/>
+                </a:solidFill>
+                <a:latin typeface="Comfortaa" panose="020F0403060000060003" pitchFamily="34" charset="0"/>
+              </a:rPr>
+              <a:t>Required user global settings for music generation</a:t>
+            </a:r>
+          </a:p>
+          <a:p>
+            <a:pPr marL="342900" indent="-342900">
+              <a:buFont typeface="Arial" panose="020B0604020202020204" pitchFamily="34" charset="0"/>
+              <a:buChar char="•"/>
+            </a:pPr>
+            <a:r>
+              <a:rPr lang="en-US" sz="3000" dirty="0">
+                <a:solidFill>
+                  <a:schemeClr val="tx1"/>
+                </a:solidFill>
+                <a:latin typeface="Comfortaa" panose="020F0403060000060003" pitchFamily="34" charset="0"/>
+              </a:rPr>
+              <a:t>Client-Server communication of music and balance of settings – which are necessary for generation and which can be handled by client</a:t>
+            </a:r>
+          </a:p>
+          <a:p>
+            <a:pPr marL="342900" indent="-342900">
+              <a:buFont typeface="Arial" panose="020B0604020202020204" pitchFamily="34" charset="0"/>
+              <a:buChar char="•"/>
+            </a:pPr>
+            <a:r>
+              <a:rPr lang="en-US" sz="3000" dirty="0">
+                <a:solidFill>
+                  <a:schemeClr val="tx1"/>
+                </a:solidFill>
+                <a:latin typeface="Comfortaa" panose="020F0403060000060003" pitchFamily="34" charset="0"/>
+              </a:rPr>
+              <a:t>Multithreading vs. GPUs balance in Markov training (much more material to parallelize) and generation (fewer parts and heavier computation)</a:t>
+            </a:r>
           </a:p>
         </p:txBody>
       </p:sp>
@@ -2294,7 +2486,7 @@
         </p:nvSpPr>
         <p:spPr>
           <a:xfrm>
-            <a:off x="33390292" y="14095767"/>
+            <a:off x="32908052" y="13587423"/>
             <a:ext cx="10047018" cy="1107988"/>
           </a:xfrm>
         </p:spPr>
@@ -2305,11 +2497,11 @@
             <a:r>
               <a:rPr lang="en-US" sz="6000" u="none" dirty="0">
                 <a:solidFill>
-                  <a:schemeClr val="tx1"/>
-                </a:solidFill>
-                <a:latin typeface="Comfortaa" panose="020F0403060000060003" pitchFamily="34" charset="0"/>
-              </a:rPr>
-              <a:t>Acknowledgments</a:t>
+                  <a:srgbClr val="02326D"/>
+                </a:solidFill>
+                <a:latin typeface="Comfortaa" panose="020F0403060000060003" pitchFamily="34" charset="0"/>
+              </a:rPr>
+              <a:t>Conclusion</a:t>
             </a:r>
           </a:p>
         </p:txBody>
@@ -2324,17 +2516,231 @@
             <p:ph type="body" sz="quarter" idx="28"/>
           </p:nvPr>
         </p:nvSpPr>
-        <p:spPr/>
+        <p:spPr>
+          <a:xfrm>
+            <a:off x="33361325" y="14519753"/>
+            <a:ext cx="10052050" cy="12981993"/>
+          </a:xfrm>
+        </p:spPr>
         <p:txBody>
           <a:bodyPr/>
           <a:lstStyle/>
           <a:p>
-            <a:endParaRPr lang="en-US">
+            <a:pPr marL="342900" indent="-342900">
+              <a:buFont typeface="Arial" panose="020B0604020202020204" pitchFamily="34" charset="0"/>
+              <a:buChar char="•"/>
+            </a:pPr>
+            <a:r>
+              <a:rPr lang="en-US" sz="3000" dirty="0">
+                <a:solidFill>
+                  <a:schemeClr val="tx1"/>
+                </a:solidFill>
+                <a:latin typeface="Comfortaa" panose="020F0403060000060003" pitchFamily="34" charset="0"/>
+              </a:rPr>
+              <a:t>Real-time video game music generator!</a:t>
+            </a:r>
+          </a:p>
+          <a:p>
+            <a:pPr marL="342900" indent="-342900">
+              <a:buFont typeface="Arial" panose="020B0604020202020204" pitchFamily="34" charset="0"/>
+              <a:buChar char="•"/>
+            </a:pPr>
+            <a:endParaRPr lang="en-US" sz="3000" dirty="0">
               <a:solidFill>
                 <a:schemeClr val="tx1"/>
               </a:solidFill>
               <a:latin typeface="Comfortaa" panose="020F0403060000060003" pitchFamily="34" charset="0"/>
             </a:endParaRPr>
+          </a:p>
+          <a:p>
+            <a:pPr marL="342900" indent="-342900">
+              <a:buFont typeface="Arial" panose="020B0604020202020204" pitchFamily="34" charset="0"/>
+              <a:buChar char="•"/>
+            </a:pPr>
+            <a:endParaRPr lang="en-US" sz="3000" dirty="0">
+              <a:solidFill>
+                <a:schemeClr val="tx1"/>
+              </a:solidFill>
+              <a:latin typeface="Comfortaa" panose="020F0403060000060003" pitchFamily="34" charset="0"/>
+            </a:endParaRPr>
+          </a:p>
+          <a:p>
+            <a:pPr marL="342900" indent="-342900">
+              <a:buFont typeface="Arial" panose="020B0604020202020204" pitchFamily="34" charset="0"/>
+              <a:buChar char="•"/>
+            </a:pPr>
+            <a:endParaRPr lang="en-US" sz="3000" dirty="0">
+              <a:solidFill>
+                <a:schemeClr val="tx1"/>
+              </a:solidFill>
+              <a:latin typeface="Comfortaa" panose="020F0403060000060003" pitchFamily="34" charset="0"/>
+            </a:endParaRPr>
+          </a:p>
+          <a:p>
+            <a:pPr marL="342900" indent="-342900">
+              <a:buFont typeface="Arial" panose="020B0604020202020204" pitchFamily="34" charset="0"/>
+              <a:buChar char="•"/>
+            </a:pPr>
+            <a:endParaRPr lang="en-US" sz="3000" dirty="0">
+              <a:solidFill>
+                <a:schemeClr val="tx1"/>
+              </a:solidFill>
+              <a:latin typeface="Comfortaa" panose="020F0403060000060003" pitchFamily="34" charset="0"/>
+            </a:endParaRPr>
+          </a:p>
+          <a:p>
+            <a:pPr marL="342900" indent="-342900">
+              <a:buFont typeface="Arial" panose="020B0604020202020204" pitchFamily="34" charset="0"/>
+              <a:buChar char="•"/>
+            </a:pPr>
+            <a:endParaRPr lang="en-US" sz="3000" dirty="0">
+              <a:solidFill>
+                <a:schemeClr val="tx1"/>
+              </a:solidFill>
+              <a:latin typeface="Comfortaa" panose="020F0403060000060003" pitchFamily="34" charset="0"/>
+            </a:endParaRPr>
+          </a:p>
+          <a:p>
+            <a:pPr marL="342900" indent="-342900">
+              <a:buFont typeface="Arial" panose="020B0604020202020204" pitchFamily="34" charset="0"/>
+              <a:buChar char="•"/>
+            </a:pPr>
+            <a:endParaRPr lang="en-US" sz="3000" dirty="0">
+              <a:solidFill>
+                <a:schemeClr val="tx1"/>
+              </a:solidFill>
+              <a:latin typeface="Comfortaa" panose="020F0403060000060003" pitchFamily="34" charset="0"/>
+            </a:endParaRPr>
+          </a:p>
+          <a:p>
+            <a:endParaRPr lang="en-US" sz="3000" dirty="0">
+              <a:solidFill>
+                <a:schemeClr val="tx1"/>
+              </a:solidFill>
+              <a:latin typeface="Comfortaa" panose="020F0403060000060003" pitchFamily="34" charset="0"/>
+            </a:endParaRPr>
+          </a:p>
+          <a:p>
+            <a:pPr marL="342900" indent="-342900">
+              <a:buFont typeface="Arial" panose="020B0604020202020204" pitchFamily="34" charset="0"/>
+              <a:buChar char="•"/>
+            </a:pPr>
+            <a:r>
+              <a:rPr lang="en-US" sz="3000" dirty="0">
+                <a:solidFill>
+                  <a:schemeClr val="tx1"/>
+                </a:solidFill>
+                <a:latin typeface="Comfortaa" panose="020F0403060000060003" pitchFamily="34" charset="0"/>
+              </a:rPr>
+              <a:t>With parallelism, we see speedup in both model training and music generation</a:t>
+            </a:r>
+          </a:p>
+          <a:p>
+            <a:pPr marL="342900" indent="-342900">
+              <a:buFont typeface="Arial" panose="020B0604020202020204" pitchFamily="34" charset="0"/>
+              <a:buChar char="•"/>
+            </a:pPr>
+            <a:r>
+              <a:rPr lang="en-US" sz="3000" dirty="0">
+                <a:solidFill>
+                  <a:schemeClr val="tx1"/>
+                </a:solidFill>
+                <a:latin typeface="Comfortaa" panose="020F0403060000060003" pitchFamily="34" charset="0"/>
+              </a:rPr>
+              <a:t>Depending on the structure of the issue, multiple forms of parallelism (GPUs vs. multithreading) are better for different problems</a:t>
+            </a:r>
+          </a:p>
+          <a:p>
+            <a:pPr marL="342900" indent="-342900">
+              <a:buFont typeface="Arial" panose="020B0604020202020204" pitchFamily="34" charset="0"/>
+              <a:buChar char="•"/>
+            </a:pPr>
+            <a:r>
+              <a:rPr lang="en-US" sz="3000" dirty="0">
+                <a:solidFill>
+                  <a:schemeClr val="tx1"/>
+                </a:solidFill>
+                <a:latin typeface="Comfortaa" panose="020F0403060000060003" pitchFamily="34" charset="0"/>
+              </a:rPr>
+              <a:t>Even with communication costs, especially between voices, parallelism is still able to achieve both speedup and musicality</a:t>
+            </a:r>
+            <a:endParaRPr lang="en-US" sz="3300" dirty="0">
+              <a:solidFill>
+                <a:srgbClr val="3C2D63"/>
+              </a:solidFill>
+              <a:latin typeface="Comfortaa" panose="020F0403060000060003" pitchFamily="34" charset="0"/>
+            </a:endParaRPr>
+          </a:p>
+          <a:p>
+            <a:r>
+              <a:rPr lang="en-US" sz="3300" dirty="0">
+                <a:solidFill>
+                  <a:srgbClr val="3C2D63"/>
+                </a:solidFill>
+                <a:latin typeface="Comfortaa" panose="020F0403060000060003" pitchFamily="34" charset="0"/>
+              </a:rPr>
+              <a:t>Future Applications:</a:t>
+            </a:r>
+          </a:p>
+          <a:p>
+            <a:pPr marL="342900" indent="-342900">
+              <a:buFont typeface="Arial" panose="020B0604020202020204" pitchFamily="34" charset="0"/>
+              <a:buChar char="•"/>
+            </a:pPr>
+            <a:r>
+              <a:rPr lang="en-US" sz="3000" dirty="0">
+                <a:solidFill>
+                  <a:schemeClr val="tx1"/>
+                </a:solidFill>
+                <a:latin typeface="Comfortaa" panose="020F0403060000060003" pitchFamily="34" charset="0"/>
+              </a:rPr>
+              <a:t>Explore feasibility of using parallel computation for video game music in industry</a:t>
+            </a:r>
+          </a:p>
+          <a:p>
+            <a:pPr marL="342900" indent="-342900">
+              <a:buFont typeface="Arial" panose="020B0604020202020204" pitchFamily="34" charset="0"/>
+              <a:buChar char="•"/>
+            </a:pPr>
+            <a:r>
+              <a:rPr lang="en-US" sz="3000" dirty="0">
+                <a:solidFill>
+                  <a:schemeClr val="tx1"/>
+                </a:solidFill>
+                <a:latin typeface="Comfortaa" panose="020F0403060000060003" pitchFamily="34" charset="0"/>
+              </a:rPr>
+              <a:t>Generating video game music in real time along with gameplay</a:t>
+            </a:r>
+          </a:p>
+          <a:p>
+            <a:pPr marL="342900" indent="-342900">
+              <a:buFont typeface="Arial" panose="020B0604020202020204" pitchFamily="34" charset="0"/>
+              <a:buChar char="•"/>
+            </a:pPr>
+            <a:r>
+              <a:rPr lang="en-US" sz="3000" dirty="0">
+                <a:solidFill>
+                  <a:schemeClr val="tx1"/>
+                </a:solidFill>
+                <a:latin typeface="Comfortaa" panose="020F0403060000060003" pitchFamily="34" charset="0"/>
+              </a:rPr>
+              <a:t>Further and more complicated setting manipulation on the client side</a:t>
+            </a:r>
+          </a:p>
+          <a:p>
+            <a:pPr marL="342900" indent="-342900">
+              <a:buFont typeface="Arial" panose="020B0604020202020204" pitchFamily="34" charset="0"/>
+              <a:buChar char="•"/>
+            </a:pPr>
+            <a:r>
+              <a:rPr lang="en-US" sz="3000" dirty="0">
+                <a:solidFill>
+                  <a:schemeClr val="tx1"/>
+                </a:solidFill>
+                <a:latin typeface="Comfortaa" panose="020F0403060000060003" pitchFamily="34" charset="0"/>
+              </a:rPr>
+              <a:t>Expansion into other genres/types of music</a:t>
+            </a:r>
           </a:p>
         </p:txBody>
       </p:sp>
@@ -2350,7 +2756,7 @@
         </p:nvSpPr>
         <p:spPr>
           <a:xfrm>
-            <a:off x="33390292" y="25594763"/>
+            <a:off x="33445224" y="27255798"/>
             <a:ext cx="10047018" cy="923322"/>
           </a:xfrm>
         </p:spPr>
@@ -2361,7 +2767,7 @@
             <a:r>
               <a:rPr lang="en-US" sz="4800" dirty="0">
                 <a:solidFill>
-                  <a:schemeClr val="tx1"/>
+                  <a:srgbClr val="02326D"/>
                 </a:solidFill>
                 <a:latin typeface="Comfortaa" panose="020F0403060000060003" pitchFamily="34" charset="0"/>
               </a:rPr>
@@ -2380,17 +2786,122 @@
             <p:ph type="body" sz="quarter" idx="30"/>
           </p:nvPr>
         </p:nvSpPr>
-        <p:spPr/>
+        <p:spPr>
+          <a:xfrm>
+            <a:off x="33347160" y="28159041"/>
+            <a:ext cx="10052050" cy="3046966"/>
+          </a:xfrm>
+        </p:spPr>
         <p:txBody>
           <a:bodyPr/>
           <a:lstStyle/>
           <a:p>
-            <a:endParaRPr lang="en-US">
-              <a:solidFill>
-                <a:schemeClr val="tx1"/>
-              </a:solidFill>
-              <a:latin typeface="Comfortaa" panose="020F0403060000060003" pitchFamily="34" charset="0"/>
-            </a:endParaRPr>
+            <a:pPr marL="342900" indent="-342900">
+              <a:buFont typeface="Arial" panose="020B0604020202020204" pitchFamily="34" charset="0"/>
+              <a:buChar char="•"/>
+            </a:pPr>
+            <a:r>
+              <a:rPr lang="en-US" sz="2000" dirty="0">
+                <a:solidFill>
+                  <a:schemeClr val="tx1"/>
+                </a:solidFill>
+                <a:latin typeface="Comfortaa" panose="020F0403060000060003" pitchFamily="34" charset="0"/>
+              </a:rPr>
+              <a:t>“Algorithmic Composer.” </a:t>
+            </a:r>
+            <a:r>
+              <a:rPr lang="en-US" sz="2000" dirty="0" err="1">
+                <a:solidFill>
+                  <a:schemeClr val="tx1"/>
+                </a:solidFill>
+                <a:latin typeface="Comfortaa" panose="020F0403060000060003" pitchFamily="34" charset="0"/>
+              </a:rPr>
+              <a:t>OpenMusic</a:t>
+            </a:r>
+            <a:r>
+              <a:rPr lang="en-US" sz="2000" dirty="0">
+                <a:solidFill>
+                  <a:schemeClr val="tx1"/>
+                </a:solidFill>
+                <a:latin typeface="Comfortaa" panose="020F0403060000060003" pitchFamily="34" charset="0"/>
+              </a:rPr>
+              <a:t> Markov Chains and </a:t>
+            </a:r>
+            <a:r>
+              <a:rPr lang="en-US" sz="2000" dirty="0" err="1">
+                <a:solidFill>
+                  <a:schemeClr val="tx1"/>
+                </a:solidFill>
+                <a:latin typeface="Comfortaa" panose="020F0403060000060003" pitchFamily="34" charset="0"/>
+              </a:rPr>
+              <a:t>Omlea</a:t>
+            </a:r>
+            <a:r>
+              <a:rPr lang="en-US" sz="2000" dirty="0">
+                <a:solidFill>
+                  <a:schemeClr val="tx1"/>
+                </a:solidFill>
+                <a:latin typeface="Comfortaa" panose="020F0403060000060003" pitchFamily="34" charset="0"/>
+              </a:rPr>
+              <a:t>, 23 Apr. 2010, www.algorithmiccomposer.com/2010/04/openmusic-markov-chains-and-omlea.html.</a:t>
+            </a:r>
+          </a:p>
+          <a:p>
+            <a:pPr marL="342900" indent="-342900">
+              <a:buFont typeface="Arial" panose="020B0604020202020204" pitchFamily="34" charset="0"/>
+              <a:buChar char="•"/>
+            </a:pPr>
+            <a:r>
+              <a:rPr lang="en-US" sz="2000" dirty="0" err="1">
+                <a:solidFill>
+                  <a:schemeClr val="tx1"/>
+                </a:solidFill>
+                <a:latin typeface="Comfortaa" panose="020F0403060000060003" pitchFamily="34" charset="0"/>
+              </a:rPr>
+              <a:t>Elowsson</a:t>
+            </a:r>
+            <a:r>
+              <a:rPr lang="en-US" sz="2000" dirty="0">
+                <a:solidFill>
+                  <a:schemeClr val="tx1"/>
+                </a:solidFill>
+                <a:latin typeface="Comfortaa" panose="020F0403060000060003" pitchFamily="34" charset="0"/>
+              </a:rPr>
+              <a:t>, A. and Friberg, A. “Algorithmic Composition of Popular Music,” in Proceedings of the 12th International Conference on Music Perception and Cognition and the 8th Triennial Conference of the European Society for the Cognitive Sciences of Music, July 2012, pp 276-285</a:t>
+            </a:r>
+          </a:p>
+          <a:p>
+            <a:pPr marL="342900" indent="-342900">
+              <a:buFont typeface="Arial" panose="020B0604020202020204" pitchFamily="34" charset="0"/>
+              <a:buChar char="•"/>
+            </a:pPr>
+            <a:r>
+              <a:rPr lang="en-US" sz="2000" dirty="0">
+                <a:solidFill>
+                  <a:schemeClr val="tx1"/>
+                </a:solidFill>
+                <a:latin typeface="Comfortaa" panose="020F0403060000060003" pitchFamily="34" charset="0"/>
+              </a:rPr>
+              <a:t>Dannenberg, R. (2018). Music Generation and Algorithmic Composition [</a:t>
+            </a:r>
+            <a:r>
+              <a:rPr lang="en-US" sz="2000" dirty="0" err="1">
+                <a:solidFill>
+                  <a:schemeClr val="tx1"/>
+                </a:solidFill>
+                <a:latin typeface="Comfortaa" panose="020F0403060000060003" pitchFamily="34" charset="0"/>
+              </a:rPr>
+              <a:t>Powerpoint</a:t>
+            </a:r>
+            <a:r>
+              <a:rPr lang="en-US" sz="2000" dirty="0">
+                <a:solidFill>
+                  <a:schemeClr val="tx1"/>
+                </a:solidFill>
+                <a:latin typeface="Comfortaa" panose="020F0403060000060003" pitchFamily="34" charset="0"/>
+              </a:rPr>
+              <a:t> slides]. Retrieved from http://www.cs.cmu.edu/~./music/cmsip/slides/05-algo-comp.pdf</a:t>
+            </a:r>
           </a:p>
         </p:txBody>
       </p:sp>
@@ -2404,12 +2915,100 @@
             <p:ph type="body" sz="quarter" idx="96"/>
           </p:nvPr>
         </p:nvSpPr>
-        <p:spPr/>
+        <p:spPr>
+          <a:xfrm>
+            <a:off x="459674" y="14519752"/>
+            <a:ext cx="10056813" cy="6832617"/>
+          </a:xfrm>
+        </p:spPr>
         <p:txBody>
           <a:bodyPr/>
           <a:lstStyle/>
           <a:p>
-            <a:endParaRPr lang="en-US">
+            <a:pPr marL="342900" indent="-342900">
+              <a:buFont typeface="Arial" panose="020B0604020202020204" pitchFamily="34" charset="0"/>
+              <a:buChar char="•"/>
+            </a:pPr>
+            <a:r>
+              <a:rPr lang="en-US" sz="3000" dirty="0">
+                <a:solidFill>
+                  <a:schemeClr val="tx1"/>
+                </a:solidFill>
+                <a:latin typeface="Comfortaa" panose="020F0403060000060003" pitchFamily="34" charset="0"/>
+              </a:rPr>
+              <a:t>Music is rules by many rigid guidelines – leading to straightforward algorithmic implementation</a:t>
+            </a:r>
+          </a:p>
+          <a:p>
+            <a:pPr marL="342900" indent="-342900">
+              <a:buFont typeface="Arial" panose="020B0604020202020204" pitchFamily="34" charset="0"/>
+              <a:buChar char="•"/>
+            </a:pPr>
+            <a:r>
+              <a:rPr lang="en-US" sz="3000" dirty="0">
+                <a:solidFill>
+                  <a:schemeClr val="tx1"/>
+                </a:solidFill>
+                <a:latin typeface="Comfortaa" panose="020F0403060000060003" pitchFamily="34" charset="0"/>
+              </a:rPr>
+              <a:t>Parallel algorithmic composers need a component to parallelize on</a:t>
+            </a:r>
+          </a:p>
+          <a:p>
+            <a:pPr marL="342900" indent="-342900">
+              <a:buFont typeface="Arial" panose="020B0604020202020204" pitchFamily="34" charset="0"/>
+              <a:buChar char="•"/>
+            </a:pPr>
+            <a:r>
+              <a:rPr lang="en-US" sz="3000" dirty="0">
+                <a:solidFill>
+                  <a:schemeClr val="tx1"/>
+                </a:solidFill>
+                <a:latin typeface="Comfortaa" panose="020F0403060000060003" pitchFamily="34" charset="0"/>
+              </a:rPr>
+              <a:t>Video game music - characterized by the overlapping of multiple melodic lines and a repetitive and structured format</a:t>
+            </a:r>
+          </a:p>
+          <a:p>
+            <a:pPr marL="342900" indent="-342900">
+              <a:buFont typeface="Arial" panose="020B0604020202020204" pitchFamily="34" charset="0"/>
+              <a:buChar char="•"/>
+            </a:pPr>
+            <a:r>
+              <a:rPr lang="en-US" sz="3000" dirty="0">
+                <a:solidFill>
+                  <a:schemeClr val="tx1"/>
+                </a:solidFill>
+                <a:latin typeface="Comfortaa" panose="020F0403060000060003" pitchFamily="34" charset="0"/>
+              </a:rPr>
+              <a:t>Many melodic lines offer ample avenues for parallelization - parallel synthesis of different parts</a:t>
+            </a:r>
+          </a:p>
+          <a:p>
+            <a:pPr marL="342900" indent="-342900">
+              <a:buFont typeface="Arial" panose="020B0604020202020204" pitchFamily="34" charset="0"/>
+              <a:buChar char="•"/>
+            </a:pPr>
+            <a:r>
+              <a:rPr lang="en-US" sz="3000" dirty="0">
+                <a:solidFill>
+                  <a:schemeClr val="tx1"/>
+                </a:solidFill>
+                <a:latin typeface="Comfortaa" panose="020F0403060000060003" pitchFamily="34" charset="0"/>
+              </a:rPr>
+              <a:t>Rigid structure makes such music easier to predict and generate with a Markov Model</a:t>
+            </a:r>
+          </a:p>
+          <a:p>
+            <a:endParaRPr lang="en-US" dirty="0">
+              <a:solidFill>
+                <a:schemeClr val="tx1"/>
+              </a:solidFill>
+              <a:latin typeface="Comfortaa" panose="020F0403060000060003" pitchFamily="34" charset="0"/>
+            </a:endParaRPr>
+          </a:p>
+          <a:p>
+            <a:endParaRPr lang="en-US" dirty="0">
               <a:solidFill>
                 <a:schemeClr val="tx1"/>
               </a:solidFill>
@@ -2428,7 +3027,12 @@
             <p:ph type="body" sz="quarter" idx="150"/>
           </p:nvPr>
         </p:nvSpPr>
-        <p:spPr/>
+        <p:spPr>
+          <a:xfrm>
+            <a:off x="5932593" y="3132357"/>
+            <a:ext cx="31998968" cy="1104236"/>
+          </a:xfrm>
+        </p:spPr>
         <p:txBody>
           <a:bodyPr/>
           <a:lstStyle/>
@@ -2455,10 +3059,15 @@
             <p:ph type="body" sz="quarter" idx="151"/>
           </p:nvPr>
         </p:nvSpPr>
-        <p:spPr/>
+        <p:spPr>
+          <a:xfrm>
+            <a:off x="5932593" y="2230787"/>
+            <a:ext cx="31998968" cy="1280160"/>
+          </a:xfrm>
+        </p:spPr>
         <p:txBody>
           <a:bodyPr>
-            <a:normAutofit fontScale="70000" lnSpcReduction="20000"/>
+            <a:normAutofit fontScale="77500" lnSpcReduction="20000"/>
           </a:bodyPr>
           <a:lstStyle/>
           <a:p>
@@ -2469,45 +3078,7 @@
                 </a:solidFill>
                 <a:latin typeface="Comfortaa" panose="020F0403060000060003" pitchFamily="34" charset="0"/>
               </a:rPr>
-              <a:t>Annie Xu (</a:t>
-            </a:r>
-            <a:r>
-              <a:rPr lang="en-US" dirty="0">
-                <a:solidFill>
-                  <a:schemeClr val="tx1"/>
-                </a:solidFill>
-                <a:latin typeface="Comfortaa" panose="020F0403060000060003" pitchFamily="34" charset="0"/>
-                <a:hlinkClick r:id="rId2"/>
-              </a:rPr>
-              <a:t>jingjinx@andrew.cmu.edu</a:t>
-            </a:r>
-            <a:r>
-              <a:rPr lang="en-US" dirty="0">
-                <a:solidFill>
-                  <a:schemeClr val="tx1"/>
-                </a:solidFill>
-                <a:latin typeface="Comfortaa" panose="020F0403060000060003" pitchFamily="34" charset="0"/>
-              </a:rPr>
-              <a:t>) 	Michael You (</a:t>
-            </a:r>
-            <a:r>
-              <a:rPr lang="en-US" dirty="0">
-                <a:solidFill>
-                  <a:schemeClr val="tx1"/>
-                </a:solidFill>
-                <a:latin typeface="Comfortaa" panose="020F0403060000060003" pitchFamily="34" charset="0"/>
-                <a:hlinkClick r:id="rId3"/>
-              </a:rPr>
-              <a:t>myou@andrew.cmu.edu</a:t>
-            </a:r>
-            <a:r>
-              <a:rPr lang="en-US" dirty="0">
-                <a:solidFill>
-                  <a:schemeClr val="tx1"/>
-                </a:solidFill>
-                <a:latin typeface="Comfortaa" panose="020F0403060000060003" pitchFamily="34" charset="0"/>
-              </a:rPr>
-              <a:t>)</a:t>
+              <a:t>Annie Xu (jingjinx@andrew.cmu.edu) 	Michael You (myou@andrew.cmu.edu)</a:t>
             </a:r>
           </a:p>
         </p:txBody>
@@ -2522,7 +3093,12 @@
             <p:ph type="body" sz="quarter" idx="153"/>
           </p:nvPr>
         </p:nvSpPr>
-        <p:spPr/>
+        <p:spPr>
+          <a:xfrm>
+            <a:off x="5932593" y="669013"/>
+            <a:ext cx="31998968" cy="1637973"/>
+          </a:xfrm>
+        </p:spPr>
         <p:txBody>
           <a:bodyPr>
             <a:normAutofit fontScale="92500" lnSpcReduction="10000"/>
@@ -2532,7 +3108,7 @@
             <a:r>
               <a:rPr lang="en-US" dirty="0">
                 <a:solidFill>
-                  <a:schemeClr val="tx1"/>
+                  <a:srgbClr val="3C2D63"/>
                 </a:solidFill>
                 <a:latin typeface="Comfortaa" panose="020F0403060000060003" pitchFamily="34" charset="0"/>
               </a:rPr>
@@ -2555,7 +3131,7 @@
         </p:nvSpPr>
         <p:spPr>
           <a:xfrm>
-            <a:off x="11680455" y="6886247"/>
+            <a:off x="11680455" y="5514647"/>
             <a:ext cx="9694548" cy="3163330"/>
           </a:xfrm>
           <a:prstGeom prst="roundRect">
@@ -2662,7 +3238,7 @@
         </p:nvSpPr>
         <p:spPr>
           <a:xfrm>
-            <a:off x="11723586" y="10572557"/>
+            <a:off x="11723586" y="9632757"/>
             <a:ext cx="9608285" cy="8047952"/>
           </a:xfrm>
           <a:prstGeom prst="roundRect">
@@ -2737,6 +3313,21 @@
               </a:rPr>
               <a:t>Parallelized over multiple GPUs, threads</a:t>
             </a:r>
+          </a:p>
+          <a:p>
+            <a:pPr marL="1143000" indent="-1143000">
+              <a:buFont typeface="Arial" panose="020B0604020202020204" pitchFamily="34" charset="0"/>
+              <a:buChar char="•"/>
+            </a:pPr>
+            <a:r>
+              <a:rPr lang="en-US" sz="4800" dirty="0">
+                <a:solidFill>
+                  <a:schemeClr val="tx1"/>
+                </a:solidFill>
+                <a:latin typeface="Comfortaa" panose="020F0403060000060003" pitchFamily="34" charset="0"/>
+              </a:rPr>
+              <a:t>Split between matrix type (major/minor, soprano/bass/chord) on GPUs and file section on threads</a:t>
+            </a:r>
             <a:endParaRPr lang="en-US" sz="8000" dirty="0">
               <a:solidFill>
                 <a:schemeClr val="tx1"/>
@@ -2760,7 +3351,7 @@
         </p:nvSpPr>
         <p:spPr>
           <a:xfrm>
-            <a:off x="11680455" y="19085239"/>
+            <a:off x="11680455" y="18145439"/>
             <a:ext cx="9694548" cy="8194570"/>
           </a:xfrm>
           <a:prstGeom prst="roundRect">
@@ -2818,7 +3409,7 @@
                 </a:solidFill>
                 <a:latin typeface="Comfortaa" panose="020F0403060000060003" pitchFamily="34" charset="0"/>
               </a:rPr>
-              <a:t>Creates music based on client request</a:t>
+              <a:t>Creates music based on client request and global settings</a:t>
             </a:r>
           </a:p>
           <a:p>
@@ -2879,8 +3470,8 @@
         </p:nvSpPr>
         <p:spPr>
           <a:xfrm>
-            <a:off x="11680455" y="27837540"/>
-            <a:ext cx="9651416" cy="3876467"/>
+            <a:off x="11680455" y="27429694"/>
+            <a:ext cx="9651416" cy="3344513"/>
           </a:xfrm>
           <a:prstGeom prst="roundRect">
             <a:avLst>
@@ -2957,6 +3548,362 @@
           </a:p>
         </p:txBody>
       </p:sp>
+      <p:pic>
+        <p:nvPicPr>
+          <p:cNvPr id="1026" name="Picture 2" descr="Image result for markov music composition">
+            <a:extLst>
+              <a:ext uri="{FF2B5EF4-FFF2-40B4-BE49-F238E27FC236}">
+                <a16:creationId xmlns:a16="http://schemas.microsoft.com/office/drawing/2014/main" id="{4AE01563-7A3F-4BDA-A019-35A4BDC0CE93}"/>
+              </a:ext>
+            </a:extLst>
+          </p:cNvPr>
+          <p:cNvPicPr>
+            <a:picLocks noChangeAspect="1" noChangeArrowheads="1"/>
+          </p:cNvPicPr>
+          <p:nvPr/>
+        </p:nvPicPr>
+        <p:blipFill>
+          <a:blip r:embed="rId3">
+            <a:extLst>
+              <a:ext uri="{28A0092B-C50C-407E-A947-70E740481C1C}">
+                <a14:useLocalDpi xmlns:a14="http://schemas.microsoft.com/office/drawing/2010/main" val="0"/>
+              </a:ext>
+            </a:extLst>
+          </a:blip>
+          <a:srcRect/>
+          <a:stretch>
+            <a:fillRect/>
+          </a:stretch>
+        </p:blipFill>
+        <p:spPr bwMode="auto">
+          <a:xfrm>
+            <a:off x="2103431" y="20444339"/>
+            <a:ext cx="5719769" cy="5739980"/>
+          </a:xfrm>
+          <a:prstGeom prst="rect">
+            <a:avLst/>
+          </a:prstGeom>
+          <a:noFill/>
+          <a:extLst>
+            <a:ext uri="{909E8E84-426E-40DD-AFC4-6F175D3DCCD1}">
+              <a14:hiddenFill xmlns:a14="http://schemas.microsoft.com/office/drawing/2010/main">
+                <a:solidFill>
+                  <a:srgbClr val="FFFFFF"/>
+                </a:solidFill>
+              </a14:hiddenFill>
+            </a:ext>
+          </a:extLst>
+        </p:spPr>
+      </p:pic>
+      <p:sp>
+        <p:nvSpPr>
+          <p:cNvPr id="5" name="TextBox 4">
+            <a:extLst>
+              <a:ext uri="{FF2B5EF4-FFF2-40B4-BE49-F238E27FC236}">
+                <a16:creationId xmlns:a16="http://schemas.microsoft.com/office/drawing/2014/main" id="{C5A6AD80-9AB1-4204-A90B-D54242836D0B}"/>
+              </a:ext>
+            </a:extLst>
+          </p:cNvPr>
+          <p:cNvSpPr txBox="1"/>
+          <p:nvPr/>
+        </p:nvSpPr>
+        <p:spPr>
+          <a:xfrm>
+            <a:off x="787400" y="26466800"/>
+            <a:ext cx="8534400" cy="4708981"/>
+          </a:xfrm>
+          <a:prstGeom prst="rect">
+            <a:avLst/>
+          </a:prstGeom>
+          <a:noFill/>
+        </p:spPr>
+        <p:txBody>
+          <a:bodyPr wrap="square" rtlCol="0">
+            <a:spAutoFit/>
+          </a:bodyPr>
+          <a:lstStyle/>
+          <a:p>
+            <a:pPr marL="342900" indent="-342900">
+              <a:buFont typeface="Arial" panose="020B0604020202020204" pitchFamily="34" charset="0"/>
+              <a:buChar char="•"/>
+            </a:pPr>
+            <a:r>
+              <a:rPr lang="en-US" sz="3000" dirty="0">
+                <a:latin typeface="Comfortaa" panose="020F0403060000060003"/>
+                <a:cs typeface="Times New Roman" panose="02020603050405020304" pitchFamily="18" charset="0"/>
+              </a:rPr>
+              <a:t>Matrices built from training data which fits a specified genre/format</a:t>
+            </a:r>
+          </a:p>
+          <a:p>
+            <a:pPr marL="342900" indent="-342900">
+              <a:buFont typeface="Arial" panose="020B0604020202020204" pitchFamily="34" charset="0"/>
+              <a:buChar char="•"/>
+            </a:pPr>
+            <a:r>
+              <a:rPr lang="en-US" sz="3000" dirty="0">
+                <a:latin typeface="Comfortaa" panose="020F0403060000060003"/>
+                <a:cs typeface="Times New Roman" panose="02020603050405020304" pitchFamily="18" charset="0"/>
+              </a:rPr>
+              <a:t>Normalized probabilities based on the number of transitions of a certain form</a:t>
+            </a:r>
+          </a:p>
+          <a:p>
+            <a:pPr marL="342900" indent="-342900">
+              <a:buFont typeface="Arial" panose="020B0604020202020204" pitchFamily="34" charset="0"/>
+              <a:buChar char="•"/>
+            </a:pPr>
+            <a:r>
+              <a:rPr lang="en-US" sz="3000" dirty="0">
+                <a:latin typeface="Comfortaa" panose="020F0403060000060003"/>
+                <a:cs typeface="Times New Roman" panose="02020603050405020304" pitchFamily="18" charset="0"/>
+              </a:rPr>
+              <a:t>During generation, probabilities used to generate next note based on the notes appearing around it</a:t>
+            </a:r>
+          </a:p>
+          <a:p>
+            <a:pPr marL="342900" indent="-342900">
+              <a:buFont typeface="Arial" panose="020B0604020202020204" pitchFamily="34" charset="0"/>
+              <a:buChar char="•"/>
+            </a:pPr>
+            <a:r>
+              <a:rPr lang="en-US" sz="3000" dirty="0">
+                <a:latin typeface="Comfortaa" panose="020F0403060000060003"/>
+                <a:cs typeface="Times New Roman" panose="02020603050405020304" pitchFamily="18" charset="0"/>
+              </a:rPr>
+              <a:t>Resulting melodies likely follow similar structure and sounds as training music</a:t>
+            </a:r>
+          </a:p>
+          <a:p>
+            <a:pPr marL="342900" indent="-342900">
+              <a:buFont typeface="Arial" panose="020B0604020202020204" pitchFamily="34" charset="0"/>
+              <a:buChar char="•"/>
+            </a:pPr>
+            <a:r>
+              <a:rPr lang="en-US" sz="3000" dirty="0">
+                <a:latin typeface="Comfortaa" panose="020F0403060000060003"/>
+                <a:cs typeface="Times New Roman" panose="02020603050405020304" pitchFamily="18" charset="0"/>
+              </a:rPr>
+              <a:t>Conductor keeps melodies from veering too far into randomness</a:t>
+            </a:r>
+          </a:p>
+        </p:txBody>
+      </p:sp>
+      <p:sp>
+        <p:nvSpPr>
+          <p:cNvPr id="7" name="Half Frame 6">
+            <a:extLst>
+              <a:ext uri="{FF2B5EF4-FFF2-40B4-BE49-F238E27FC236}">
+                <a16:creationId xmlns:a16="http://schemas.microsoft.com/office/drawing/2014/main" id="{F712D5F8-25B5-48BB-9038-65EDC62B32BC}"/>
+              </a:ext>
+            </a:extLst>
+          </p:cNvPr>
+          <p:cNvSpPr/>
+          <p:nvPr/>
+        </p:nvSpPr>
+        <p:spPr>
+          <a:xfrm>
+            <a:off x="459674" y="4232939"/>
+            <a:ext cx="42939536" cy="1161148"/>
+          </a:xfrm>
+          <a:prstGeom prst="halfFrame">
+            <a:avLst>
+              <a:gd name="adj1" fmla="val 18780"/>
+              <a:gd name="adj2" fmla="val 24601"/>
+            </a:avLst>
+          </a:prstGeom>
+          <a:solidFill>
+            <a:srgbClr val="406E8E"/>
+          </a:solidFill>
+        </p:spPr>
+        <p:style>
+          <a:lnRef idx="2">
+            <a:schemeClr val="accent1">
+              <a:shade val="50000"/>
+            </a:schemeClr>
+          </a:lnRef>
+          <a:fillRef idx="1">
+            <a:schemeClr val="accent1"/>
+          </a:fillRef>
+          <a:effectRef idx="0">
+            <a:schemeClr val="accent1"/>
+          </a:effectRef>
+          <a:fontRef idx="minor">
+            <a:schemeClr val="lt1"/>
+          </a:fontRef>
+        </p:style>
+        <p:txBody>
+          <a:bodyPr rtlCol="0" anchor="ctr"/>
+          <a:lstStyle/>
+          <a:p>
+            <a:pPr algn="ctr"/>
+            <a:endParaRPr lang="en-US">
+              <a:solidFill>
+                <a:schemeClr val="tx1"/>
+              </a:solidFill>
+            </a:endParaRPr>
+          </a:p>
+        </p:txBody>
+      </p:sp>
+      <p:sp>
+        <p:nvSpPr>
+          <p:cNvPr id="24" name="Half Frame 23">
+            <a:extLst>
+              <a:ext uri="{FF2B5EF4-FFF2-40B4-BE49-F238E27FC236}">
+                <a16:creationId xmlns:a16="http://schemas.microsoft.com/office/drawing/2014/main" id="{CEEF33B6-FE29-41DA-97D3-0E9563812C9E}"/>
+              </a:ext>
+            </a:extLst>
+          </p:cNvPr>
+          <p:cNvSpPr/>
+          <p:nvPr/>
+        </p:nvSpPr>
+        <p:spPr>
+          <a:xfrm rot="10800000">
+            <a:off x="491990" y="30567704"/>
+            <a:ext cx="43005284" cy="1161148"/>
+          </a:xfrm>
+          <a:prstGeom prst="halfFrame">
+            <a:avLst>
+              <a:gd name="adj1" fmla="val 18780"/>
+              <a:gd name="adj2" fmla="val 24601"/>
+            </a:avLst>
+          </a:prstGeom>
+          <a:solidFill>
+            <a:srgbClr val="8EA8C3"/>
+          </a:solidFill>
+        </p:spPr>
+        <p:style>
+          <a:lnRef idx="2">
+            <a:schemeClr val="accent1">
+              <a:shade val="50000"/>
+            </a:schemeClr>
+          </a:lnRef>
+          <a:fillRef idx="1">
+            <a:schemeClr val="accent1"/>
+          </a:fillRef>
+          <a:effectRef idx="0">
+            <a:schemeClr val="accent1"/>
+          </a:effectRef>
+          <a:fontRef idx="minor">
+            <a:schemeClr val="lt1"/>
+          </a:fontRef>
+        </p:style>
+        <p:txBody>
+          <a:bodyPr rtlCol="0" anchor="ctr"/>
+          <a:lstStyle/>
+          <a:p>
+            <a:pPr algn="ctr"/>
+            <a:endParaRPr lang="en-US">
+              <a:solidFill>
+                <a:schemeClr val="tx1"/>
+              </a:solidFill>
+            </a:endParaRPr>
+          </a:p>
+        </p:txBody>
+      </p:sp>
+      <p:sp>
+        <p:nvSpPr>
+          <p:cNvPr id="20" name="Half Frame 19">
+            <a:extLst>
+              <a:ext uri="{FF2B5EF4-FFF2-40B4-BE49-F238E27FC236}">
+                <a16:creationId xmlns:a16="http://schemas.microsoft.com/office/drawing/2014/main" id="{D49ACB46-338F-4AB7-B893-13D49BB376D0}"/>
+              </a:ext>
+            </a:extLst>
+          </p:cNvPr>
+          <p:cNvSpPr/>
+          <p:nvPr/>
+        </p:nvSpPr>
+        <p:spPr>
+          <a:xfrm rot="10800000">
+            <a:off x="2128831" y="12793474"/>
+            <a:ext cx="8661400" cy="877460"/>
+          </a:xfrm>
+          <a:prstGeom prst="halfFrame">
+            <a:avLst>
+              <a:gd name="adj1" fmla="val 8684"/>
+              <a:gd name="adj2" fmla="val 14474"/>
+            </a:avLst>
+          </a:prstGeom>
+          <a:solidFill>
+            <a:srgbClr val="8EA8C3"/>
+          </a:solidFill>
+        </p:spPr>
+        <p:style>
+          <a:lnRef idx="2">
+            <a:schemeClr val="accent1">
+              <a:shade val="50000"/>
+            </a:schemeClr>
+          </a:lnRef>
+          <a:fillRef idx="1">
+            <a:schemeClr val="accent1"/>
+          </a:fillRef>
+          <a:effectRef idx="0">
+            <a:schemeClr val="accent1"/>
+          </a:effectRef>
+          <a:fontRef idx="minor">
+            <a:schemeClr val="lt1"/>
+          </a:fontRef>
+        </p:style>
+        <p:txBody>
+          <a:bodyPr rtlCol="0" anchor="ctr"/>
+          <a:lstStyle/>
+          <a:p>
+            <a:pPr algn="ctr"/>
+            <a:endParaRPr lang="en-US">
+              <a:solidFill>
+                <a:schemeClr val="tx1"/>
+              </a:solidFill>
+            </a:endParaRPr>
+          </a:p>
+        </p:txBody>
+      </p:sp>
+      <p:pic>
+        <p:nvPicPr>
+          <p:cNvPr id="1028" name="Picture 4" descr="https://scontent-iad3-1.xx.fbcdn.net/v/t1.15752-9/s2048x2048/46521382_265244067517433_3665060455996456960_n.png?_nc_cat=109&amp;_nc_ht=scontent-iad3-1.xx&amp;oh=97844b5ac2bfb2b4f6dafff81793a6bf&amp;oe=5CA211A4">
+            <a:extLst>
+              <a:ext uri="{FF2B5EF4-FFF2-40B4-BE49-F238E27FC236}">
+                <a16:creationId xmlns:a16="http://schemas.microsoft.com/office/drawing/2014/main" id="{919C3DD2-8E51-4DAB-991F-E13E37C7B8BE}"/>
+              </a:ext>
+            </a:extLst>
+          </p:cNvPr>
+          <p:cNvPicPr>
+            <a:picLocks noChangeAspect="1" noChangeArrowheads="1"/>
+          </p:cNvPicPr>
+          <p:nvPr/>
+        </p:nvPicPr>
+        <p:blipFill>
+          <a:blip r:embed="rId4" cstate="print">
+            <a:extLst>
+              <a:ext uri="{28A0092B-C50C-407E-A947-70E740481C1C}">
+                <a14:useLocalDpi xmlns:a14="http://schemas.microsoft.com/office/drawing/2010/main" val="0"/>
+              </a:ext>
+            </a:extLst>
+          </a:blip>
+          <a:srcRect/>
+          <a:stretch>
+            <a:fillRect/>
+          </a:stretch>
+        </p:blipFill>
+        <p:spPr bwMode="auto">
+          <a:xfrm>
+            <a:off x="34556012" y="15374204"/>
+            <a:ext cx="7811188" cy="3569957"/>
+          </a:xfrm>
+          <a:prstGeom prst="rect">
+            <a:avLst/>
+          </a:prstGeom>
+          <a:noFill/>
+          <a:extLst>
+            <a:ext uri="{909E8E84-426E-40DD-AFC4-6F175D3DCCD1}">
+              <a14:hiddenFill xmlns:a14="http://schemas.microsoft.com/office/drawing/2010/main">
+                <a:solidFill>
+                  <a:srgbClr val="FFFFFF"/>
+                </a:solidFill>
+              </a14:hiddenFill>
+            </a:ext>
+          </a:extLst>
+        </p:spPr>
+      </p:pic>
     </p:spTree>
     <p:extLst>
       <p:ext uri="{BB962C8B-B14F-4D97-AF65-F5344CB8AC3E}">

</xml_diff>

<commit_message>
changes to right panel. PDF example
</commit_message>
<xml_diff>
--- a/poster/finalPoster.pptx
+++ b/poster/finalPoster.pptx
@@ -2295,8 +2295,8 @@
         </p:nvSpPr>
         <p:spPr>
           <a:xfrm>
-            <a:off x="33390292" y="5438681"/>
-            <a:ext cx="10047018" cy="8402278"/>
+            <a:off x="33390292" y="5438680"/>
+            <a:ext cx="9642952" cy="8593932"/>
           </a:xfrm>
         </p:spPr>
         <p:txBody>
@@ -2344,7 +2344,7 @@
                 </a:solidFill>
                 <a:latin typeface="Comfortaa" panose="020F0403060000060003" pitchFamily="34" charset="0"/>
               </a:rPr>
-              <a:t>Pre-processing and server algorithms use different programming languages and parallelism techniques</a:t>
+              <a:t>Pre-processing and server algorithms use different languages and parallelism techniques</a:t>
             </a:r>
           </a:p>
           <a:p>
@@ -2374,7 +2374,7 @@
                 </a:solidFill>
                 <a:latin typeface="Comfortaa" panose="020F0403060000060003" pitchFamily="34" charset="0"/>
               </a:rPr>
-              <a:t>Gave user the ability to customize the music they wanted to generate</a:t>
+              <a:t>Client-Server communication of generation settings and live music generation results</a:t>
             </a:r>
           </a:p>
           <a:p>
@@ -2389,7 +2389,7 @@
                 </a:solidFill>
                 <a:latin typeface="Comfortaa" panose="020F0403060000060003" pitchFamily="34" charset="0"/>
               </a:rPr>
-              <a:t>Client-Server communication of generation settings and live-time user input</a:t>
+              <a:t>Multithreading vs. GPUs balance in Markov training (much more material to parallelize) and generation (fewer parts and heavier computation)</a:t>
             </a:r>
           </a:p>
           <a:p>
@@ -2404,8 +2404,20 @@
                 </a:solidFill>
                 <a:latin typeface="Comfortaa" panose="020F0403060000060003" pitchFamily="34" charset="0"/>
               </a:rPr>
-              <a:t>Multithreading vs. GPUs balance in Markov training (much more material to parallelize) and generation (fewer parts and heavier computation)</a:t>
+              <a:t>Gave user the ability to customize the music they wanted to generate, including live-mixing</a:t>
             </a:r>
+          </a:p>
+          <a:p>
+            <a:pPr marL="342900" indent="-342900">
+              <a:buFont typeface="Arial" panose="020B0604020202020204" pitchFamily="34" charset="0"/>
+              <a:buChar char="•"/>
+            </a:pPr>
+            <a:endParaRPr lang="en-US" sz="3000" dirty="0">
+              <a:solidFill>
+                <a:schemeClr val="tx1"/>
+              </a:solidFill>
+              <a:latin typeface="Comfortaa" panose="020F0403060000060003" pitchFamily="34" charset="0"/>
+            </a:endParaRPr>
           </a:p>
         </p:txBody>
       </p:sp>
@@ -2421,8 +2433,8 @@
         </p:nvSpPr>
         <p:spPr>
           <a:xfrm>
-            <a:off x="32908052" y="13587423"/>
-            <a:ext cx="10047018" cy="1107988"/>
+            <a:off x="32961224" y="13742093"/>
+            <a:ext cx="10039781" cy="1107988"/>
           </a:xfrm>
         </p:spPr>
         <p:txBody>
@@ -2436,7 +2448,7 @@
                 </a:solidFill>
                 <a:latin typeface="Comfortaa" panose="020F0403060000060003" pitchFamily="34" charset="0"/>
               </a:rPr>
-              <a:t>Conclusion &amp; Future Work</a:t>
+              <a:t>Conclusion</a:t>
             </a:r>
           </a:p>
         </p:txBody>
@@ -2453,8 +2465,8 @@
         </p:nvSpPr>
         <p:spPr>
           <a:xfrm>
-            <a:off x="33361325" y="14519753"/>
-            <a:ext cx="10052050" cy="12981993"/>
+            <a:off x="33414497" y="14674424"/>
+            <a:ext cx="9642952" cy="4772126"/>
           </a:xfrm>
         </p:spPr>
         <p:txBody>
@@ -2472,8 +2484,59 @@
                 </a:solidFill>
                 <a:latin typeface="Comfortaa" panose="020F0403060000060003" pitchFamily="34" charset="0"/>
               </a:rPr>
-              <a:t>Real-time video game music generator!</a:t>
+              <a:t>Created a real-time video game music generator!</a:t>
             </a:r>
+          </a:p>
+          <a:p>
+            <a:pPr marL="342900" indent="-342900">
+              <a:buFont typeface="Arial" panose="020B0604020202020204" pitchFamily="34" charset="0"/>
+              <a:buChar char="•"/>
+            </a:pPr>
+            <a:r>
+              <a:rPr lang="en-US" sz="3000" dirty="0">
+                <a:solidFill>
+                  <a:schemeClr val="tx1"/>
+                </a:solidFill>
+                <a:latin typeface="Comfortaa" panose="020F0403060000060003" pitchFamily="34" charset="0"/>
+              </a:rPr>
+              <a:t>With parallelism, we see speedup in both model training and music generation</a:t>
+            </a:r>
+          </a:p>
+          <a:p>
+            <a:pPr marL="342900" indent="-342900">
+              <a:buFont typeface="Arial" panose="020B0604020202020204" pitchFamily="34" charset="0"/>
+              <a:buChar char="•"/>
+            </a:pPr>
+            <a:r>
+              <a:rPr lang="en-US" sz="3000" dirty="0">
+                <a:solidFill>
+                  <a:schemeClr val="tx1"/>
+                </a:solidFill>
+                <a:latin typeface="Comfortaa" panose="020F0403060000060003" pitchFamily="34" charset="0"/>
+              </a:rPr>
+              <a:t>Depending on the structure of the issue, multiple forms of parallelism (GPUs vs. multithreading) are better for different problems</a:t>
+            </a:r>
+          </a:p>
+          <a:p>
+            <a:pPr marL="342900" indent="-342900">
+              <a:buFont typeface="Arial" panose="020B0604020202020204" pitchFamily="34" charset="0"/>
+              <a:buChar char="•"/>
+            </a:pPr>
+            <a:r>
+              <a:rPr lang="en-US" sz="3000" dirty="0">
+                <a:solidFill>
+                  <a:schemeClr val="tx1"/>
+                </a:solidFill>
+                <a:latin typeface="Comfortaa" panose="020F0403060000060003" pitchFamily="34" charset="0"/>
+              </a:rPr>
+              <a:t>Even with communication costs, especially between voices, parallelism is still able to achieve both speedup and maintain musicality</a:t>
+            </a:r>
+            <a:endParaRPr lang="en-US" sz="3300" dirty="0">
+              <a:solidFill>
+                <a:schemeClr val="tx1"/>
+              </a:solidFill>
+              <a:latin typeface="Comfortaa" panose="020F0403060000060003" pitchFamily="34" charset="0"/>
+            </a:endParaRPr>
           </a:p>
           <a:p>
             <a:pPr marL="342900" indent="-342900">
@@ -2486,196 +2549,6 @@
               </a:solidFill>
               <a:latin typeface="Comfortaa" panose="020F0403060000060003" pitchFamily="34" charset="0"/>
             </a:endParaRPr>
-          </a:p>
-          <a:p>
-            <a:pPr marL="342900" indent="-342900">
-              <a:buFont typeface="Arial" panose="020B0604020202020204" pitchFamily="34" charset="0"/>
-              <a:buChar char="•"/>
-            </a:pPr>
-            <a:endParaRPr lang="en-US" sz="3000" dirty="0">
-              <a:solidFill>
-                <a:schemeClr val="tx1"/>
-              </a:solidFill>
-              <a:latin typeface="Comfortaa" panose="020F0403060000060003" pitchFamily="34" charset="0"/>
-            </a:endParaRPr>
-          </a:p>
-          <a:p>
-            <a:pPr marL="342900" indent="-342900">
-              <a:buFont typeface="Arial" panose="020B0604020202020204" pitchFamily="34" charset="0"/>
-              <a:buChar char="•"/>
-            </a:pPr>
-            <a:endParaRPr lang="en-US" sz="3000" dirty="0">
-              <a:solidFill>
-                <a:schemeClr val="tx1"/>
-              </a:solidFill>
-              <a:latin typeface="Comfortaa" panose="020F0403060000060003" pitchFamily="34" charset="0"/>
-            </a:endParaRPr>
-          </a:p>
-          <a:p>
-            <a:pPr marL="342900" indent="-342900">
-              <a:buFont typeface="Arial" panose="020B0604020202020204" pitchFamily="34" charset="0"/>
-              <a:buChar char="•"/>
-            </a:pPr>
-            <a:endParaRPr lang="en-US" sz="3000" dirty="0">
-              <a:solidFill>
-                <a:schemeClr val="tx1"/>
-              </a:solidFill>
-              <a:latin typeface="Comfortaa" panose="020F0403060000060003" pitchFamily="34" charset="0"/>
-            </a:endParaRPr>
-          </a:p>
-          <a:p>
-            <a:pPr marL="342900" indent="-342900">
-              <a:buFont typeface="Arial" panose="020B0604020202020204" pitchFamily="34" charset="0"/>
-              <a:buChar char="•"/>
-            </a:pPr>
-            <a:endParaRPr lang="en-US" sz="3000" dirty="0">
-              <a:solidFill>
-                <a:schemeClr val="tx1"/>
-              </a:solidFill>
-              <a:latin typeface="Comfortaa" panose="020F0403060000060003" pitchFamily="34" charset="0"/>
-            </a:endParaRPr>
-          </a:p>
-          <a:p>
-            <a:pPr marL="342900" indent="-342900">
-              <a:buFont typeface="Arial" panose="020B0604020202020204" pitchFamily="34" charset="0"/>
-              <a:buChar char="•"/>
-            </a:pPr>
-            <a:endParaRPr lang="en-US" sz="3000" dirty="0">
-              <a:solidFill>
-                <a:schemeClr val="tx1"/>
-              </a:solidFill>
-              <a:latin typeface="Comfortaa" panose="020F0403060000060003" pitchFamily="34" charset="0"/>
-            </a:endParaRPr>
-          </a:p>
-          <a:p>
-            <a:endParaRPr lang="en-US" sz="3000" dirty="0">
-              <a:solidFill>
-                <a:schemeClr val="tx1"/>
-              </a:solidFill>
-              <a:latin typeface="Comfortaa" panose="020F0403060000060003" pitchFamily="34" charset="0"/>
-            </a:endParaRPr>
-          </a:p>
-          <a:p>
-            <a:pPr marL="342900" indent="-342900">
-              <a:buFont typeface="Arial" panose="020B0604020202020204" pitchFamily="34" charset="0"/>
-              <a:buChar char="•"/>
-            </a:pPr>
-            <a:r>
-              <a:rPr lang="en-US" sz="3000" dirty="0">
-                <a:solidFill>
-                  <a:schemeClr val="tx1"/>
-                </a:solidFill>
-                <a:latin typeface="Comfortaa" panose="020F0403060000060003" pitchFamily="34" charset="0"/>
-              </a:rPr>
-              <a:t>With parallelism, we see speedup in both model training and music generation</a:t>
-            </a:r>
-          </a:p>
-          <a:p>
-            <a:pPr marL="342900" indent="-342900">
-              <a:buFont typeface="Arial" panose="020B0604020202020204" pitchFamily="34" charset="0"/>
-              <a:buChar char="•"/>
-            </a:pPr>
-            <a:r>
-              <a:rPr lang="en-US" sz="3000" dirty="0">
-                <a:solidFill>
-                  <a:schemeClr val="tx1"/>
-                </a:solidFill>
-                <a:latin typeface="Comfortaa" panose="020F0403060000060003" pitchFamily="34" charset="0"/>
-              </a:rPr>
-              <a:t>Depending on the structure of the issue, multiple forms of parallelism (GPUs vs. multithreading) are better for different problems</a:t>
-            </a:r>
-          </a:p>
-          <a:p>
-            <a:pPr marL="342900" indent="-342900">
-              <a:buFont typeface="Arial" panose="020B0604020202020204" pitchFamily="34" charset="0"/>
-              <a:buChar char="•"/>
-            </a:pPr>
-            <a:r>
-              <a:rPr lang="en-US" sz="3000" dirty="0">
-                <a:solidFill>
-                  <a:schemeClr val="tx1"/>
-                </a:solidFill>
-                <a:latin typeface="Comfortaa" panose="020F0403060000060003" pitchFamily="34" charset="0"/>
-              </a:rPr>
-              <a:t>Even with communication costs, especially between voices, parallelism is still able to achieve both speedup and musicality</a:t>
-            </a:r>
-            <a:endParaRPr lang="en-US" sz="3300" dirty="0">
-              <a:solidFill>
-                <a:schemeClr val="tx1"/>
-              </a:solidFill>
-              <a:latin typeface="Comfortaa" panose="020F0403060000060003" pitchFamily="34" charset="0"/>
-            </a:endParaRPr>
-          </a:p>
-          <a:p>
-            <a:r>
-              <a:rPr lang="en-US" sz="3300" dirty="0">
-                <a:solidFill>
-                  <a:schemeClr val="tx1"/>
-                </a:solidFill>
-                <a:latin typeface="Comfortaa" panose="020F0403060000060003" pitchFamily="34" charset="0"/>
-              </a:rPr>
-              <a:t>Future Applications:</a:t>
-            </a:r>
-          </a:p>
-          <a:p>
-            <a:pPr marL="342900" indent="-342900">
-              <a:buFont typeface="Arial" panose="020B0604020202020204" pitchFamily="34" charset="0"/>
-              <a:buChar char="•"/>
-            </a:pPr>
-            <a:r>
-              <a:rPr lang="en-US" sz="3000" dirty="0">
-                <a:solidFill>
-                  <a:schemeClr val="tx1"/>
-                </a:solidFill>
-                <a:latin typeface="Comfortaa" panose="020F0403060000060003" pitchFamily="34" charset="0"/>
-              </a:rPr>
-              <a:t>Explore feasibility of using parallel computation for video game music in industry</a:t>
-            </a:r>
-          </a:p>
-          <a:p>
-            <a:pPr marL="342900" indent="-342900">
-              <a:buFont typeface="Arial" panose="020B0604020202020204" pitchFamily="34" charset="0"/>
-              <a:buChar char="•"/>
-            </a:pPr>
-            <a:r>
-              <a:rPr lang="en-US" sz="3000" dirty="0">
-                <a:solidFill>
-                  <a:schemeClr val="tx1"/>
-                </a:solidFill>
-                <a:latin typeface="Comfortaa" panose="020F0403060000060003" pitchFamily="34" charset="0"/>
-              </a:rPr>
-              <a:t>Generating video game music in real time along with gameplay</a:t>
-            </a:r>
-          </a:p>
-          <a:p>
-            <a:pPr marL="342900" indent="-342900">
-              <a:buFont typeface="Arial" panose="020B0604020202020204" pitchFamily="34" charset="0"/>
-              <a:buChar char="•"/>
-            </a:pPr>
-            <a:r>
-              <a:rPr lang="en-US" sz="3000" dirty="0">
-                <a:solidFill>
-                  <a:schemeClr val="tx1"/>
-                </a:solidFill>
-                <a:latin typeface="Comfortaa" panose="020F0403060000060003" pitchFamily="34" charset="0"/>
-              </a:rPr>
-              <a:t>Further and more complicated setting manipulation on the client side</a:t>
-            </a:r>
-          </a:p>
-          <a:p>
-            <a:pPr marL="342900" indent="-342900">
-              <a:buFont typeface="Arial" panose="020B0604020202020204" pitchFamily="34" charset="0"/>
-              <a:buChar char="•"/>
-            </a:pPr>
-            <a:r>
-              <a:rPr lang="en-US" sz="3000" dirty="0">
-                <a:solidFill>
-                  <a:schemeClr val="tx1"/>
-                </a:solidFill>
-                <a:latin typeface="Comfortaa" panose="020F0403060000060003" pitchFamily="34" charset="0"/>
-              </a:rPr>
-              <a:t>Expansion into other genres/types of music</a:t>
-            </a:r>
           </a:p>
         </p:txBody>
       </p:sp>
@@ -2691,7 +2564,7 @@
         </p:nvSpPr>
         <p:spPr>
           <a:xfrm>
-            <a:off x="33445224" y="27348130"/>
+            <a:off x="32815020" y="26532197"/>
             <a:ext cx="10047018" cy="738656"/>
           </a:xfrm>
         </p:spPr>
@@ -2700,7 +2573,7 @@
           <a:lstStyle/>
           <a:p>
             <a:r>
-              <a:rPr lang="en-US" sz="3600" dirty="0">
+              <a:rPr lang="en-US" sz="3600" u="none" dirty="0">
                 <a:solidFill>
                   <a:schemeClr val="tx1"/>
                 </a:solidFill>
@@ -2723,8 +2596,8 @@
         </p:nvSpPr>
         <p:spPr>
           <a:xfrm>
-            <a:off x="33347160" y="28159041"/>
-            <a:ext cx="10052050" cy="2283680"/>
+            <a:off x="33405364" y="27343108"/>
+            <a:ext cx="9363642" cy="3957984"/>
           </a:xfrm>
         </p:spPr>
         <p:txBody>
@@ -2837,6 +2710,63 @@
               </a:rPr>
               <a:t> slides]. Retrieved from http://www.cs.cmu.edu/~./music/cmsip/slides/05-algo-comp.pdf</a:t>
             </a:r>
+          </a:p>
+          <a:p>
+            <a:pPr marL="342900" indent="-342900">
+              <a:buFont typeface="Arial" panose="020B0604020202020204" pitchFamily="34" charset="0"/>
+              <a:buChar char="•"/>
+            </a:pPr>
+            <a:r>
+              <a:rPr lang="en-US" sz="1600" dirty="0">
+                <a:solidFill>
+                  <a:schemeClr val="tx1"/>
+                </a:solidFill>
+                <a:latin typeface="Comfortaa" panose="020F0403060000060003" pitchFamily="34" charset="0"/>
+              </a:rPr>
+              <a:t>Collins, Karen. “In the Loop: Creativity and Constraint in 8-Bit Video Game Audio.” Twentieth-Century Music, vol. 4, no. 2, 2007, pp. 209–227., doi:10.1017/S1478572208000510.</a:t>
+            </a:r>
+          </a:p>
+          <a:p>
+            <a:pPr marL="342900" indent="-342900">
+              <a:buFont typeface="Arial" panose="020B0604020202020204" pitchFamily="34" charset="0"/>
+              <a:buChar char="•"/>
+            </a:pPr>
+            <a:r>
+              <a:rPr lang="en-US" sz="1600" dirty="0">
+                <a:solidFill>
+                  <a:schemeClr val="tx1"/>
+                </a:solidFill>
+                <a:latin typeface="Comfortaa" panose="020F0403060000060003" pitchFamily="34" charset="0"/>
+              </a:rPr>
+              <a:t>Whalen, Zach. "Case Study: Film Music vs. Video game Music: The case of Silent Hill.“ 2007.</a:t>
+            </a:r>
+          </a:p>
+          <a:p>
+            <a:pPr marL="342900" indent="-342900">
+              <a:buFont typeface="Arial" panose="020B0604020202020204" pitchFamily="34" charset="0"/>
+              <a:buChar char="•"/>
+            </a:pPr>
+            <a:r>
+              <a:rPr lang="en-US" sz="1600" dirty="0">
+                <a:solidFill>
+                  <a:schemeClr val="tx1"/>
+                </a:solidFill>
+                <a:latin typeface="Comfortaa" panose="020F0403060000060003" pitchFamily="34" charset="0"/>
+              </a:rPr>
+              <a:t>Seabrook, Andrea (Host). 13 April, 2008. The Evolution of Video Game Music [All Things Considered]. https://www.npr.org/templates/story/story.php?storyId=89565567</a:t>
+            </a:r>
+          </a:p>
+          <a:p>
+            <a:pPr marL="342900" indent="-342900">
+              <a:buFont typeface="Arial" panose="020B0604020202020204" pitchFamily="34" charset="0"/>
+              <a:buChar char="•"/>
+            </a:pPr>
+            <a:endParaRPr lang="en-US" sz="1600" dirty="0">
+              <a:solidFill>
+                <a:schemeClr val="tx1"/>
+              </a:solidFill>
+              <a:latin typeface="Comfortaa" panose="020F0403060000060003" pitchFamily="34" charset="0"/>
+            </a:endParaRPr>
           </a:p>
         </p:txBody>
       </p:sp>
@@ -3051,12 +2981,12 @@
         </p:spPr>
         <p:txBody>
           <a:bodyPr>
-            <a:normAutofit fontScale="62500" lnSpcReduction="20000"/>
+            <a:normAutofit fontScale="92500"/>
           </a:bodyPr>
           <a:lstStyle/>
           <a:p>
             <a:r>
-              <a:rPr lang="en-US" dirty="0">
+              <a:rPr lang="en-US" sz="8000" dirty="0">
                 <a:solidFill>
                   <a:schemeClr val="tx1"/>
                 </a:solidFill>
@@ -3276,7 +3206,24 @@
                 </a:solidFill>
                 <a:latin typeface="Comfortaa" panose="020F0403060000060003" pitchFamily="34" charset="0"/>
               </a:rPr>
-              <a:t>Split between matrix type (major/minor, soprano / bass / chord) on GPUs </a:t>
+              <a:t>Split between matrix type (major/minor, soprano/</a:t>
+            </a:r>
+            <a:br>
+              <a:rPr lang="en-US" sz="4400" dirty="0">
+                <a:solidFill>
+                  <a:schemeClr val="tx1"/>
+                </a:solidFill>
+                <a:latin typeface="Comfortaa" panose="020F0403060000060003" pitchFamily="34" charset="0"/>
+              </a:rPr>
+            </a:br>
+            <a:r>
+              <a:rPr lang="en-US" sz="4400" dirty="0">
+                <a:solidFill>
+                  <a:schemeClr val="tx1"/>
+                </a:solidFill>
+                <a:latin typeface="Comfortaa" panose="020F0403060000060003" pitchFamily="34" charset="0"/>
+              </a:rPr>
+              <a:t>bass/chord) on GPUs </a:t>
             </a:r>
           </a:p>
           <a:p>
@@ -7969,7 +7916,7 @@
             </a:avLst>
           </a:prstGeom>
           <a:noFill/>
-          <a:ln w="76200">
+          <a:ln w="101600">
             <a:solidFill>
               <a:srgbClr val="FFC000"/>
             </a:solidFill>
@@ -8093,7 +8040,7 @@
             </a:avLst>
           </a:prstGeom>
           <a:noFill/>
-          <a:ln w="76200">
+          <a:ln w="101600">
             <a:solidFill>
               <a:srgbClr val="0070C0"/>
             </a:solidFill>
@@ -8200,8 +8147,8 @@
         </p:blipFill>
         <p:spPr bwMode="auto">
           <a:xfrm>
-            <a:off x="19741637" y="10432271"/>
-            <a:ext cx="1685408" cy="1685408"/>
+            <a:off x="19870931" y="10013519"/>
+            <a:ext cx="1365648" cy="1365648"/>
           </a:xfrm>
           <a:prstGeom prst="rect">
             <a:avLst/>
@@ -8330,7 +8277,7 @@
         </p:blipFill>
         <p:spPr bwMode="auto">
           <a:xfrm>
-            <a:off x="19691045" y="13042976"/>
+            <a:off x="19759282" y="11735965"/>
             <a:ext cx="1564869" cy="1710924"/>
           </a:xfrm>
           <a:prstGeom prst="rect">
@@ -8377,7 +8324,7 @@
         </p:blipFill>
         <p:spPr bwMode="auto">
           <a:xfrm>
-            <a:off x="19928519" y="17292243"/>
+            <a:off x="19984384" y="16829101"/>
             <a:ext cx="1089920" cy="1089920"/>
           </a:xfrm>
           <a:prstGeom prst="rect">
@@ -8503,7 +8450,7 @@
         </p:nvSpPr>
         <p:spPr>
           <a:xfrm>
-            <a:off x="19527658" y="20145366"/>
+            <a:off x="19550479" y="18942074"/>
             <a:ext cx="2028119" cy="830997"/>
           </a:xfrm>
           <a:prstGeom prst="rect">
@@ -8523,7 +8470,7 @@
                 <a:latin typeface="Courier New" panose="02070309020205020404" pitchFamily="49" charset="0"/>
                 <a:cs typeface="Courier New" panose="02070309020205020404" pitchFamily="49" charset="0"/>
               </a:rPr>
-              <a:t>multi</a:t>
+              <a:t>multi-</a:t>
             </a:r>
           </a:p>
           <a:p>
@@ -8554,7 +8501,7 @@
             </p:nvSpPr>
             <p:spPr>
               <a:xfrm>
-                <a:off x="19567860" y="21559868"/>
+                <a:off x="19599995" y="20181823"/>
                 <a:ext cx="2030423" cy="984116"/>
               </a:xfrm>
               <a:prstGeom prst="rect">
@@ -8739,7 +8686,7 @@
             </p:nvSpPr>
             <p:spPr>
               <a:xfrm>
-                <a:off x="19567860" y="21559868"/>
+                <a:off x="19599995" y="20181823"/>
                 <a:ext cx="2030423" cy="984116"/>
               </a:xfrm>
               <a:prstGeom prst="rect">
@@ -8781,7 +8728,7 @@
         </p:nvSpPr>
         <p:spPr>
           <a:xfrm>
-            <a:off x="19518664" y="19152977"/>
+            <a:off x="19515284" y="18246232"/>
             <a:ext cx="2028119" cy="461665"/>
           </a:xfrm>
           <a:prstGeom prst="rect">
@@ -8807,6 +8754,602 @@
               <a:latin typeface="Courier New" panose="02070309020205020404" pitchFamily="49" charset="0"/>
               <a:cs typeface="Courier New" panose="02070309020205020404" pitchFamily="49" charset="0"/>
             </a:endParaRPr>
+          </a:p>
+        </p:txBody>
+      </p:sp>
+      <p:pic>
+        <p:nvPicPr>
+          <p:cNvPr id="1026" name="Picture 2" descr="Image result for Intel Xeon">
+            <a:extLst>
+              <a:ext uri="{FF2B5EF4-FFF2-40B4-BE49-F238E27FC236}">
+                <a16:creationId xmlns:a16="http://schemas.microsoft.com/office/drawing/2014/main" id="{C583A656-61DB-4F25-945F-ECD77FEE5DEE}"/>
+              </a:ext>
+            </a:extLst>
+          </p:cNvPr>
+          <p:cNvPicPr>
+            <a:picLocks noChangeAspect="1" noChangeArrowheads="1"/>
+          </p:cNvPicPr>
+          <p:nvPr/>
+        </p:nvPicPr>
+        <p:blipFill>
+          <a:blip r:embed="rId11">
+            <a:extLst>
+              <a:ext uri="{28A0092B-C50C-407E-A947-70E740481C1C}">
+                <a14:useLocalDpi xmlns:a14="http://schemas.microsoft.com/office/drawing/2010/main" val="0"/>
+              </a:ext>
+            </a:extLst>
+          </a:blip>
+          <a:srcRect/>
+          <a:stretch>
+            <a:fillRect/>
+          </a:stretch>
+        </p:blipFill>
+        <p:spPr bwMode="auto">
+          <a:xfrm>
+            <a:off x="19920423" y="21610999"/>
+            <a:ext cx="1288230" cy="1288230"/>
+          </a:xfrm>
+          <a:prstGeom prst="rect">
+            <a:avLst/>
+          </a:prstGeom>
+          <a:noFill/>
+          <a:extLst>
+            <a:ext uri="{909E8E84-426E-40DD-AFC4-6F175D3DCCD1}">
+              <a14:hiddenFill xmlns:a14="http://schemas.microsoft.com/office/drawing/2010/main">
+                <a:solidFill>
+                  <a:srgbClr val="FFFFFF"/>
+                </a:solidFill>
+              </a14:hiddenFill>
+            </a:ext>
+          </a:extLst>
+        </p:spPr>
+      </p:pic>
+      <p:pic>
+        <p:nvPicPr>
+          <p:cNvPr id="1028" name="Picture 4" descr="Data Center Virtual GPU Tesla K80">
+            <a:extLst>
+              <a:ext uri="{FF2B5EF4-FFF2-40B4-BE49-F238E27FC236}">
+                <a16:creationId xmlns:a16="http://schemas.microsoft.com/office/drawing/2014/main" id="{11F7FC99-67B0-46A5-A953-1FE63A6D80BA}"/>
+              </a:ext>
+            </a:extLst>
+          </p:cNvPr>
+          <p:cNvPicPr>
+            <a:picLocks noChangeAspect="1" noChangeArrowheads="1"/>
+          </p:cNvPicPr>
+          <p:nvPr/>
+        </p:nvPicPr>
+        <p:blipFill>
+          <a:blip r:embed="rId12" cstate="print">
+            <a:extLst>
+              <a:ext uri="{28A0092B-C50C-407E-A947-70E740481C1C}">
+                <a14:useLocalDpi xmlns:a14="http://schemas.microsoft.com/office/drawing/2010/main" val="0"/>
+              </a:ext>
+            </a:extLst>
+          </a:blip>
+          <a:srcRect/>
+          <a:stretch>
+            <a:fillRect/>
+          </a:stretch>
+        </p:blipFill>
+        <p:spPr bwMode="auto">
+          <a:xfrm>
+            <a:off x="19563024" y="14296087"/>
+            <a:ext cx="2013330" cy="918079"/>
+          </a:xfrm>
+          <a:prstGeom prst="rect">
+            <a:avLst/>
+          </a:prstGeom>
+          <a:noFill/>
+          <a:extLst>
+            <a:ext uri="{909E8E84-426E-40DD-AFC4-6F175D3DCCD1}">
+              <a14:hiddenFill xmlns:a14="http://schemas.microsoft.com/office/drawing/2010/main">
+                <a:solidFill>
+                  <a:srgbClr val="FFFFFF"/>
+                </a:solidFill>
+              </a14:hiddenFill>
+            </a:ext>
+          </a:extLst>
+        </p:spPr>
+      </p:pic>
+      <p:sp>
+        <p:nvSpPr>
+          <p:cNvPr id="43" name="Text Placeholder 10">
+            <a:extLst>
+              <a:ext uri="{FF2B5EF4-FFF2-40B4-BE49-F238E27FC236}">
+                <a16:creationId xmlns:a16="http://schemas.microsoft.com/office/drawing/2014/main" id="{70C0F7CE-595A-452A-8142-833E8A4BA661}"/>
+              </a:ext>
+            </a:extLst>
+          </p:cNvPr>
+          <p:cNvSpPr txBox="1">
+            <a:spLocks/>
+          </p:cNvSpPr>
+          <p:nvPr/>
+        </p:nvSpPr>
+        <p:spPr>
+          <a:xfrm>
+            <a:off x="32979510" y="19482552"/>
+            <a:ext cx="10045700" cy="1107988"/>
+          </a:xfrm>
+          <a:prstGeom prst="rect">
+            <a:avLst/>
+          </a:prstGeom>
+          <a:noFill/>
+        </p:spPr>
+        <p:txBody>
+          <a:bodyPr wrap="square" lIns="91436" tIns="91436" rIns="91436" bIns="91436" anchor="ctr" anchorCtr="0">
+            <a:spAutoFit/>
+          </a:bodyPr>
+          <a:lstStyle>
+            <a:lvl1pPr marL="0" indent="0" algn="ctr" defTabSz="4388900" rtl="0" eaLnBrk="1" latinLnBrk="0" hangingPunct="1">
+              <a:spcBef>
+                <a:spcPct val="20000"/>
+              </a:spcBef>
+              <a:buFont typeface="Arial" pitchFamily="34" charset="0"/>
+              <a:buNone/>
+              <a:defRPr sz="3700" b="1" u="sng" kern="1200" baseline="0">
+                <a:solidFill>
+                  <a:schemeClr val="accent5">
+                    <a:lumMod val="50000"/>
+                  </a:schemeClr>
+                </a:solidFill>
+                <a:latin typeface="+mn-lt"/>
+                <a:ea typeface="+mn-ea"/>
+                <a:cs typeface="+mn-cs"/>
+              </a:defRPr>
+            </a:lvl1pPr>
+            <a:lvl2pPr marL="3565982" indent="-1371531" algn="l" defTabSz="4388900" rtl="0" eaLnBrk="1" latinLnBrk="0" hangingPunct="1">
+              <a:spcBef>
+                <a:spcPct val="20000"/>
+              </a:spcBef>
+              <a:buFont typeface="Arial" pitchFamily="34" charset="0"/>
+              <a:buChar char="–"/>
+              <a:defRPr sz="13500" kern="1200">
+                <a:solidFill>
+                  <a:schemeClr val="tx1"/>
+                </a:solidFill>
+                <a:latin typeface="+mn-lt"/>
+                <a:ea typeface="+mn-ea"/>
+                <a:cs typeface="+mn-cs"/>
+              </a:defRPr>
+            </a:lvl2pPr>
+            <a:lvl3pPr marL="5486126" indent="-1097226" algn="l" defTabSz="4388900" rtl="0" eaLnBrk="1" latinLnBrk="0" hangingPunct="1">
+              <a:spcBef>
+                <a:spcPct val="20000"/>
+              </a:spcBef>
+              <a:buFont typeface="Arial" pitchFamily="34" charset="0"/>
+              <a:buChar char="•"/>
+              <a:defRPr sz="11600" kern="1200">
+                <a:solidFill>
+                  <a:schemeClr val="tx1"/>
+                </a:solidFill>
+                <a:latin typeface="+mn-lt"/>
+                <a:ea typeface="+mn-ea"/>
+                <a:cs typeface="+mn-cs"/>
+              </a:defRPr>
+            </a:lvl3pPr>
+            <a:lvl4pPr marL="7680577" indent="-1097226" algn="l" defTabSz="4388900" rtl="0" eaLnBrk="1" latinLnBrk="0" hangingPunct="1">
+              <a:spcBef>
+                <a:spcPct val="20000"/>
+              </a:spcBef>
+              <a:buFont typeface="Arial" pitchFamily="34" charset="0"/>
+              <a:buChar char="–"/>
+              <a:defRPr sz="9600" kern="1200">
+                <a:solidFill>
+                  <a:schemeClr val="tx1"/>
+                </a:solidFill>
+                <a:latin typeface="+mn-lt"/>
+                <a:ea typeface="+mn-ea"/>
+                <a:cs typeface="+mn-cs"/>
+              </a:defRPr>
+            </a:lvl4pPr>
+            <a:lvl5pPr marL="9875026" indent="-1097226" algn="l" defTabSz="4388900" rtl="0" eaLnBrk="1" latinLnBrk="0" hangingPunct="1">
+              <a:spcBef>
+                <a:spcPct val="20000"/>
+              </a:spcBef>
+              <a:buFont typeface="Arial" pitchFamily="34" charset="0"/>
+              <a:buChar char="»"/>
+              <a:defRPr sz="9600" kern="1200">
+                <a:solidFill>
+                  <a:schemeClr val="tx1"/>
+                </a:solidFill>
+                <a:latin typeface="+mn-lt"/>
+                <a:ea typeface="+mn-ea"/>
+                <a:cs typeface="+mn-cs"/>
+              </a:defRPr>
+            </a:lvl5pPr>
+            <a:lvl6pPr marL="12069477" indent="-1097226" algn="l" defTabSz="4388900" rtl="0" eaLnBrk="1" latinLnBrk="0" hangingPunct="1">
+              <a:spcBef>
+                <a:spcPct val="20000"/>
+              </a:spcBef>
+              <a:buFont typeface="Arial" pitchFamily="34" charset="0"/>
+              <a:buChar char="•"/>
+              <a:defRPr sz="9600" kern="1200">
+                <a:solidFill>
+                  <a:schemeClr val="tx1"/>
+                </a:solidFill>
+                <a:latin typeface="+mn-lt"/>
+                <a:ea typeface="+mn-ea"/>
+                <a:cs typeface="+mn-cs"/>
+              </a:defRPr>
+            </a:lvl6pPr>
+            <a:lvl7pPr marL="14263926" indent="-1097226" algn="l" defTabSz="4388900" rtl="0" eaLnBrk="1" latinLnBrk="0" hangingPunct="1">
+              <a:spcBef>
+                <a:spcPct val="20000"/>
+              </a:spcBef>
+              <a:buFont typeface="Arial" pitchFamily="34" charset="0"/>
+              <a:buChar char="•"/>
+              <a:defRPr sz="9600" kern="1200">
+                <a:solidFill>
+                  <a:schemeClr val="tx1"/>
+                </a:solidFill>
+                <a:latin typeface="+mn-lt"/>
+                <a:ea typeface="+mn-ea"/>
+                <a:cs typeface="+mn-cs"/>
+              </a:defRPr>
+            </a:lvl7pPr>
+            <a:lvl8pPr marL="16458377" indent="-1097226" algn="l" defTabSz="4388900" rtl="0" eaLnBrk="1" latinLnBrk="0" hangingPunct="1">
+              <a:spcBef>
+                <a:spcPct val="20000"/>
+              </a:spcBef>
+              <a:buFont typeface="Arial" pitchFamily="34" charset="0"/>
+              <a:buChar char="•"/>
+              <a:defRPr sz="9600" kern="1200">
+                <a:solidFill>
+                  <a:schemeClr val="tx1"/>
+                </a:solidFill>
+                <a:latin typeface="+mn-lt"/>
+                <a:ea typeface="+mn-ea"/>
+                <a:cs typeface="+mn-cs"/>
+              </a:defRPr>
+            </a:lvl8pPr>
+            <a:lvl9pPr marL="18652827" indent="-1097226" algn="l" defTabSz="4388900" rtl="0" eaLnBrk="1" latinLnBrk="0" hangingPunct="1">
+              <a:spcBef>
+                <a:spcPct val="20000"/>
+              </a:spcBef>
+              <a:buFont typeface="Arial" pitchFamily="34" charset="0"/>
+              <a:buChar char="•"/>
+              <a:defRPr sz="9600" kern="1200">
+                <a:solidFill>
+                  <a:schemeClr val="tx1"/>
+                </a:solidFill>
+                <a:latin typeface="+mn-lt"/>
+                <a:ea typeface="+mn-ea"/>
+                <a:cs typeface="+mn-cs"/>
+              </a:defRPr>
+            </a:lvl9pPr>
+          </a:lstStyle>
+          <a:p>
+            <a:r>
+              <a:rPr lang="en-US" sz="6000" u="none" dirty="0">
+                <a:solidFill>
+                  <a:schemeClr val="tx1"/>
+                </a:solidFill>
+                <a:latin typeface="Comfortaa" panose="020F0403060000060003" pitchFamily="34" charset="0"/>
+              </a:rPr>
+              <a:t>Future Work</a:t>
+            </a:r>
+          </a:p>
+        </p:txBody>
+      </p:sp>
+      <p:sp>
+        <p:nvSpPr>
+          <p:cNvPr id="22" name="Rectangle 21">
+            <a:extLst>
+              <a:ext uri="{FF2B5EF4-FFF2-40B4-BE49-F238E27FC236}">
+                <a16:creationId xmlns:a16="http://schemas.microsoft.com/office/drawing/2014/main" id="{1186FF22-2793-4329-BFCF-A42E5D0A0AD6}"/>
+              </a:ext>
+            </a:extLst>
+          </p:cNvPr>
+          <p:cNvSpPr/>
+          <p:nvPr/>
+        </p:nvSpPr>
+        <p:spPr>
+          <a:xfrm>
+            <a:off x="33498396" y="20653387"/>
+            <a:ext cx="9678332" cy="3323987"/>
+          </a:xfrm>
+          <a:prstGeom prst="rect">
+            <a:avLst/>
+          </a:prstGeom>
+        </p:spPr>
+        <p:txBody>
+          <a:bodyPr wrap="square">
+            <a:spAutoFit/>
+          </a:bodyPr>
+          <a:lstStyle/>
+          <a:p>
+            <a:pPr marL="342900" indent="-342900">
+              <a:buFont typeface="Arial" panose="020B0604020202020204" pitchFamily="34" charset="0"/>
+              <a:buChar char="•"/>
+            </a:pPr>
+            <a:r>
+              <a:rPr lang="en-US" sz="3000" dirty="0">
+                <a:latin typeface="Comfortaa" panose="020F0403060000060003" pitchFamily="34" charset="0"/>
+              </a:rPr>
+              <a:t>Explore feasibility of using parallel computation for video game music in industry</a:t>
+            </a:r>
+          </a:p>
+          <a:p>
+            <a:pPr marL="342900" indent="-342900">
+              <a:buFont typeface="Arial" panose="020B0604020202020204" pitchFamily="34" charset="0"/>
+              <a:buChar char="•"/>
+            </a:pPr>
+            <a:r>
+              <a:rPr lang="en-US" sz="3000" dirty="0">
+                <a:latin typeface="Comfortaa" panose="020F0403060000060003" pitchFamily="34" charset="0"/>
+              </a:rPr>
+              <a:t>Generating video game music in real time along with gameplay</a:t>
+            </a:r>
+          </a:p>
+          <a:p>
+            <a:pPr marL="342900" indent="-342900">
+              <a:buFont typeface="Arial" panose="020B0604020202020204" pitchFamily="34" charset="0"/>
+              <a:buChar char="•"/>
+            </a:pPr>
+            <a:r>
+              <a:rPr lang="en-US" sz="3000" dirty="0">
+                <a:latin typeface="Comfortaa" panose="020F0403060000060003" pitchFamily="34" charset="0"/>
+              </a:rPr>
+              <a:t>Further and more complicated setting manipulation on the client side</a:t>
+            </a:r>
+          </a:p>
+          <a:p>
+            <a:pPr marL="342900" indent="-342900">
+              <a:buFont typeface="Arial" panose="020B0604020202020204" pitchFamily="34" charset="0"/>
+              <a:buChar char="•"/>
+            </a:pPr>
+            <a:r>
+              <a:rPr lang="en-US" sz="3000" dirty="0">
+                <a:latin typeface="Comfortaa" panose="020F0403060000060003" pitchFamily="34" charset="0"/>
+              </a:rPr>
+              <a:t>Expansion into other genres/types of music</a:t>
+            </a:r>
+            <a:endParaRPr lang="en-US" sz="3000" dirty="0"/>
+          </a:p>
+        </p:txBody>
+      </p:sp>
+      <p:sp>
+        <p:nvSpPr>
+          <p:cNvPr id="46" name="Text Placeholder 10">
+            <a:extLst>
+              <a:ext uri="{FF2B5EF4-FFF2-40B4-BE49-F238E27FC236}">
+                <a16:creationId xmlns:a16="http://schemas.microsoft.com/office/drawing/2014/main" id="{1BA08F73-5998-4968-B550-49E51AE8ABE6}"/>
+              </a:ext>
+            </a:extLst>
+          </p:cNvPr>
+          <p:cNvSpPr txBox="1">
+            <a:spLocks/>
+          </p:cNvSpPr>
+          <p:nvPr/>
+        </p:nvSpPr>
+        <p:spPr>
+          <a:xfrm>
+            <a:off x="32955305" y="24095546"/>
+            <a:ext cx="10045700" cy="738656"/>
+          </a:xfrm>
+          <a:prstGeom prst="rect">
+            <a:avLst/>
+          </a:prstGeom>
+          <a:noFill/>
+        </p:spPr>
+        <p:txBody>
+          <a:bodyPr wrap="square" lIns="91436" tIns="91436" rIns="91436" bIns="91436" anchor="ctr" anchorCtr="0">
+            <a:spAutoFit/>
+          </a:bodyPr>
+          <a:lstStyle>
+            <a:lvl1pPr marL="0" indent="0" algn="ctr" defTabSz="4388900" rtl="0" eaLnBrk="1" latinLnBrk="0" hangingPunct="1">
+              <a:spcBef>
+                <a:spcPct val="20000"/>
+              </a:spcBef>
+              <a:buFont typeface="Arial" pitchFamily="34" charset="0"/>
+              <a:buNone/>
+              <a:defRPr sz="3700" b="1" u="sng" kern="1200" baseline="0">
+                <a:solidFill>
+                  <a:schemeClr val="accent5">
+                    <a:lumMod val="50000"/>
+                  </a:schemeClr>
+                </a:solidFill>
+                <a:latin typeface="+mn-lt"/>
+                <a:ea typeface="+mn-ea"/>
+                <a:cs typeface="+mn-cs"/>
+              </a:defRPr>
+            </a:lvl1pPr>
+            <a:lvl2pPr marL="3565982" indent="-1371531" algn="l" defTabSz="4388900" rtl="0" eaLnBrk="1" latinLnBrk="0" hangingPunct="1">
+              <a:spcBef>
+                <a:spcPct val="20000"/>
+              </a:spcBef>
+              <a:buFont typeface="Arial" pitchFamily="34" charset="0"/>
+              <a:buChar char="–"/>
+              <a:defRPr sz="13500" kern="1200">
+                <a:solidFill>
+                  <a:schemeClr val="tx1"/>
+                </a:solidFill>
+                <a:latin typeface="+mn-lt"/>
+                <a:ea typeface="+mn-ea"/>
+                <a:cs typeface="+mn-cs"/>
+              </a:defRPr>
+            </a:lvl2pPr>
+            <a:lvl3pPr marL="5486126" indent="-1097226" algn="l" defTabSz="4388900" rtl="0" eaLnBrk="1" latinLnBrk="0" hangingPunct="1">
+              <a:spcBef>
+                <a:spcPct val="20000"/>
+              </a:spcBef>
+              <a:buFont typeface="Arial" pitchFamily="34" charset="0"/>
+              <a:buChar char="•"/>
+              <a:defRPr sz="11600" kern="1200">
+                <a:solidFill>
+                  <a:schemeClr val="tx1"/>
+                </a:solidFill>
+                <a:latin typeface="+mn-lt"/>
+                <a:ea typeface="+mn-ea"/>
+                <a:cs typeface="+mn-cs"/>
+              </a:defRPr>
+            </a:lvl3pPr>
+            <a:lvl4pPr marL="7680577" indent="-1097226" algn="l" defTabSz="4388900" rtl="0" eaLnBrk="1" latinLnBrk="0" hangingPunct="1">
+              <a:spcBef>
+                <a:spcPct val="20000"/>
+              </a:spcBef>
+              <a:buFont typeface="Arial" pitchFamily="34" charset="0"/>
+              <a:buChar char="–"/>
+              <a:defRPr sz="9600" kern="1200">
+                <a:solidFill>
+                  <a:schemeClr val="tx1"/>
+                </a:solidFill>
+                <a:latin typeface="+mn-lt"/>
+                <a:ea typeface="+mn-ea"/>
+                <a:cs typeface="+mn-cs"/>
+              </a:defRPr>
+            </a:lvl4pPr>
+            <a:lvl5pPr marL="9875026" indent="-1097226" algn="l" defTabSz="4388900" rtl="0" eaLnBrk="1" latinLnBrk="0" hangingPunct="1">
+              <a:spcBef>
+                <a:spcPct val="20000"/>
+              </a:spcBef>
+              <a:buFont typeface="Arial" pitchFamily="34" charset="0"/>
+              <a:buChar char="»"/>
+              <a:defRPr sz="9600" kern="1200">
+                <a:solidFill>
+                  <a:schemeClr val="tx1"/>
+                </a:solidFill>
+                <a:latin typeface="+mn-lt"/>
+                <a:ea typeface="+mn-ea"/>
+                <a:cs typeface="+mn-cs"/>
+              </a:defRPr>
+            </a:lvl5pPr>
+            <a:lvl6pPr marL="12069477" indent="-1097226" algn="l" defTabSz="4388900" rtl="0" eaLnBrk="1" latinLnBrk="0" hangingPunct="1">
+              <a:spcBef>
+                <a:spcPct val="20000"/>
+              </a:spcBef>
+              <a:buFont typeface="Arial" pitchFamily="34" charset="0"/>
+              <a:buChar char="•"/>
+              <a:defRPr sz="9600" kern="1200">
+                <a:solidFill>
+                  <a:schemeClr val="tx1"/>
+                </a:solidFill>
+                <a:latin typeface="+mn-lt"/>
+                <a:ea typeface="+mn-ea"/>
+                <a:cs typeface="+mn-cs"/>
+              </a:defRPr>
+            </a:lvl6pPr>
+            <a:lvl7pPr marL="14263926" indent="-1097226" algn="l" defTabSz="4388900" rtl="0" eaLnBrk="1" latinLnBrk="0" hangingPunct="1">
+              <a:spcBef>
+                <a:spcPct val="20000"/>
+              </a:spcBef>
+              <a:buFont typeface="Arial" pitchFamily="34" charset="0"/>
+              <a:buChar char="•"/>
+              <a:defRPr sz="9600" kern="1200">
+                <a:solidFill>
+                  <a:schemeClr val="tx1"/>
+                </a:solidFill>
+                <a:latin typeface="+mn-lt"/>
+                <a:ea typeface="+mn-ea"/>
+                <a:cs typeface="+mn-cs"/>
+              </a:defRPr>
+            </a:lvl7pPr>
+            <a:lvl8pPr marL="16458377" indent="-1097226" algn="l" defTabSz="4388900" rtl="0" eaLnBrk="1" latinLnBrk="0" hangingPunct="1">
+              <a:spcBef>
+                <a:spcPct val="20000"/>
+              </a:spcBef>
+              <a:buFont typeface="Arial" pitchFamily="34" charset="0"/>
+              <a:buChar char="•"/>
+              <a:defRPr sz="9600" kern="1200">
+                <a:solidFill>
+                  <a:schemeClr val="tx1"/>
+                </a:solidFill>
+                <a:latin typeface="+mn-lt"/>
+                <a:ea typeface="+mn-ea"/>
+                <a:cs typeface="+mn-cs"/>
+              </a:defRPr>
+            </a:lvl8pPr>
+            <a:lvl9pPr marL="18652827" indent="-1097226" algn="l" defTabSz="4388900" rtl="0" eaLnBrk="1" latinLnBrk="0" hangingPunct="1">
+              <a:spcBef>
+                <a:spcPct val="20000"/>
+              </a:spcBef>
+              <a:buFont typeface="Arial" pitchFamily="34" charset="0"/>
+              <a:buChar char="•"/>
+              <a:defRPr sz="9600" kern="1200">
+                <a:solidFill>
+                  <a:schemeClr val="tx1"/>
+                </a:solidFill>
+                <a:latin typeface="+mn-lt"/>
+                <a:ea typeface="+mn-ea"/>
+                <a:cs typeface="+mn-cs"/>
+              </a:defRPr>
+            </a:lvl9pPr>
+          </a:lstStyle>
+          <a:p>
+            <a:r>
+              <a:rPr lang="en-US" sz="3600" u="none" dirty="0">
+                <a:solidFill>
+                  <a:schemeClr val="tx1"/>
+                </a:solidFill>
+                <a:latin typeface="Comfortaa" panose="020F0403060000060003" pitchFamily="34" charset="0"/>
+              </a:rPr>
+              <a:t>Acknowledgments</a:t>
+            </a:r>
+          </a:p>
+        </p:txBody>
+      </p:sp>
+      <p:sp>
+        <p:nvSpPr>
+          <p:cNvPr id="48" name="Rectangle 47">
+            <a:extLst>
+              <a:ext uri="{FF2B5EF4-FFF2-40B4-BE49-F238E27FC236}">
+                <a16:creationId xmlns:a16="http://schemas.microsoft.com/office/drawing/2014/main" id="{240B58BE-66DA-461C-9541-1A3FB3A5E34E}"/>
+              </a:ext>
+            </a:extLst>
+          </p:cNvPr>
+          <p:cNvSpPr/>
+          <p:nvPr/>
+        </p:nvSpPr>
+        <p:spPr>
+          <a:xfrm>
+            <a:off x="33498396" y="24940825"/>
+            <a:ext cx="9456674" cy="1477328"/>
+          </a:xfrm>
+          <a:prstGeom prst="rect">
+            <a:avLst/>
+          </a:prstGeom>
+        </p:spPr>
+        <p:txBody>
+          <a:bodyPr wrap="square">
+            <a:spAutoFit/>
+          </a:bodyPr>
+          <a:lstStyle/>
+          <a:p>
+            <a:pPr marL="342900" indent="-342900">
+              <a:buFont typeface="Arial" panose="020B0604020202020204" pitchFamily="34" charset="0"/>
+              <a:buChar char="•"/>
+            </a:pPr>
+            <a:r>
+              <a:rPr lang="en-US" sz="3000" dirty="0">
+                <a:latin typeface="Comfortaa" panose="020F0403060000060003" pitchFamily="34" charset="0"/>
+              </a:rPr>
+              <a:t>Professor Mowry and Professor Railing</a:t>
+            </a:r>
+          </a:p>
+          <a:p>
+            <a:pPr marL="342900" indent="-342900">
+              <a:buFont typeface="Arial" panose="020B0604020202020204" pitchFamily="34" charset="0"/>
+              <a:buChar char="•"/>
+            </a:pPr>
+            <a:r>
+              <a:rPr lang="en-US" sz="3000" dirty="0">
+                <a:latin typeface="Comfortaa" panose="020F0403060000060003" pitchFamily="34" charset="0"/>
+              </a:rPr>
+              <a:t>15-418 TA Staff</a:t>
+            </a:r>
+          </a:p>
+          <a:p>
+            <a:pPr marL="342900" indent="-342900">
+              <a:buFont typeface="Arial" panose="020B0604020202020204" pitchFamily="34" charset="0"/>
+              <a:buChar char="•"/>
+            </a:pPr>
+            <a:r>
+              <a:rPr lang="en-US" sz="3000" dirty="0">
+                <a:latin typeface="Comfortaa" panose="020F0403060000060003" pitchFamily="34" charset="0"/>
+              </a:rPr>
+              <a:t>Carnegie Mellon University</a:t>
+            </a:r>
+            <a:endParaRPr lang="en-US" sz="3000" dirty="0"/>
           </a:p>
         </p:txBody>
       </p:sp>

</xml_diff>

<commit_message>
new plots, poster done
</commit_message>
<xml_diff>
--- a/poster/finalPoster.pptx
+++ b/poster/finalPoster.pptx
@@ -2564,7 +2564,7 @@
         </p:nvSpPr>
         <p:spPr>
           <a:xfrm>
-            <a:off x="32815020" y="26343120"/>
+            <a:off x="32818657" y="25792929"/>
             <a:ext cx="10047018" cy="738656"/>
           </a:xfrm>
         </p:spPr>
@@ -2596,8 +2596,8 @@
         </p:nvSpPr>
         <p:spPr>
           <a:xfrm>
-            <a:off x="33405364" y="27154031"/>
-            <a:ext cx="9363642" cy="3957984"/>
+            <a:off x="33414497" y="26457893"/>
+            <a:ext cx="9363642" cy="5041358"/>
           </a:xfrm>
         </p:spPr>
         <p:txBody>
@@ -2651,7 +2651,7 @@
                 </a:solidFill>
                 <a:latin typeface="Comfortaa" panose="020F0403060000060003" pitchFamily="34" charset="0"/>
               </a:rPr>
-              <a:t>, 23 Apr. 2010, www.algorithmiccomposer.com/2010/04/openmusic-markov-chains-and-omlea.html.</a:t>
+              <a:t>, 23 Apr. 2010.</a:t>
             </a:r>
           </a:p>
           <a:p>
@@ -2660,22 +2660,13 @@
               <a:buChar char="•"/>
             </a:pPr>
             <a:r>
-              <a:rPr lang="en-US" sz="1600" dirty="0" err="1">
+              <a:rPr lang="en-US" sz="1600" dirty="0">
                 <a:solidFill>
                   <a:schemeClr val="tx1"/>
                 </a:solidFill>
                 <a:latin typeface="Comfortaa" panose="020F0403060000060003" pitchFamily="34" charset="0"/>
               </a:rPr>
-              <a:t>Elowsson</a:t>
-            </a:r>
-            <a:r>
-              <a:rPr lang="en-US" sz="1600" dirty="0">
-                <a:solidFill>
-                  <a:schemeClr val="tx1"/>
-                </a:solidFill>
-                <a:latin typeface="Comfortaa" panose="020F0403060000060003" pitchFamily="34" charset="0"/>
-              </a:rPr>
-              <a:t>, A. and Friberg, A. “Algorithmic Composition of Popular Music,” in Proceedings of the 12th International Conference on Music Perception and Cognition and the 8th Triennial Conference of the European Society for the Cognitive Sciences of Music, July 2012, pp 276-285</a:t>
+              <a:t>Collins, Karen (2008). Game sound: an introduction to the history, theory, and practice of video game music and sound design. MIT Press. pp. 112–118. ISBN 0-262-03378-X.</a:t>
             </a:r>
           </a:p>
           <a:p>
@@ -2690,25 +2681,7 @@
                 </a:solidFill>
                 <a:latin typeface="Comfortaa" panose="020F0403060000060003" pitchFamily="34" charset="0"/>
               </a:rPr>
-              <a:t>Dannenberg, R. (2018). Music Generation and Algorithmic Composition [</a:t>
-            </a:r>
-            <a:r>
-              <a:rPr lang="en-US" sz="1600" dirty="0" err="1">
-                <a:solidFill>
-                  <a:schemeClr val="tx1"/>
-                </a:solidFill>
-                <a:latin typeface="Comfortaa" panose="020F0403060000060003" pitchFamily="34" charset="0"/>
-              </a:rPr>
-              <a:t>Powerpoint</a:t>
-            </a:r>
-            <a:r>
-              <a:rPr lang="en-US" sz="1600" dirty="0">
-                <a:solidFill>
-                  <a:schemeClr val="tx1"/>
-                </a:solidFill>
-                <a:latin typeface="Comfortaa" panose="020F0403060000060003" pitchFamily="34" charset="0"/>
-              </a:rPr>
-              <a:t> slides]. Retrieved from http://www.cs.cmu.edu/~./music/cmsip/slides/05-algo-comp.pdf</a:t>
+              <a:t>Collins, Karen. “In the Loop: Creativity and Constraint in 8-Bit Video Game Audio.” Twentieth-Century Music, vol. 4, no. 2, 2007, pp. 209–227., doi:10.1017/S1478572208000510.</a:t>
             </a:r>
           </a:p>
           <a:p>
@@ -2723,7 +2696,25 @@
                 </a:solidFill>
                 <a:latin typeface="Comfortaa" panose="020F0403060000060003" pitchFamily="34" charset="0"/>
               </a:rPr>
-              <a:t>Collins, Karen. “In the Loop: Creativity and Constraint in 8-Bit Video Game Audio.” Twentieth-Century Music, vol. 4, no. 2, 2007, pp. 209–227., doi:10.1017/S1478572208000510.</a:t>
+              <a:t>Dannenberg, R. (2018). Music Generation and Algorithmic Composition [</a:t>
+            </a:r>
+            <a:r>
+              <a:rPr lang="en-US" sz="1600" dirty="0" err="1">
+                <a:solidFill>
+                  <a:schemeClr val="tx1"/>
+                </a:solidFill>
+                <a:latin typeface="Comfortaa" panose="020F0403060000060003" pitchFamily="34" charset="0"/>
+              </a:rPr>
+              <a:t>Powerpoint</a:t>
+            </a:r>
+            <a:r>
+              <a:rPr lang="en-US" sz="1600" dirty="0">
+                <a:solidFill>
+                  <a:schemeClr val="tx1"/>
+                </a:solidFill>
+                <a:latin typeface="Comfortaa" panose="020F0403060000060003" pitchFamily="34" charset="0"/>
+              </a:rPr>
+              <a:t> slides]. Retrieved from http://www.cs.cmu.edu/~./music/cmsip/slides/05-algo-comp.pdf</a:t>
             </a:r>
           </a:p>
           <a:p>
@@ -2732,13 +2723,22 @@
               <a:buChar char="•"/>
             </a:pPr>
             <a:r>
-              <a:rPr lang="en-US" sz="1600" dirty="0">
+              <a:rPr lang="en-US" sz="1600" dirty="0" err="1">
                 <a:solidFill>
                   <a:schemeClr val="tx1"/>
                 </a:solidFill>
                 <a:latin typeface="Comfortaa" panose="020F0403060000060003" pitchFamily="34" charset="0"/>
               </a:rPr>
-              <a:t>Whalen, Zach. "Case Study: Film Music vs. Video game Music: The case of Silent Hill.“ 2007.</a:t>
+              <a:t>Elowsson</a:t>
+            </a:r>
+            <a:r>
+              <a:rPr lang="en-US" sz="1600" dirty="0">
+                <a:solidFill>
+                  <a:schemeClr val="tx1"/>
+                </a:solidFill>
+                <a:latin typeface="Comfortaa" panose="020F0403060000060003" pitchFamily="34" charset="0"/>
+              </a:rPr>
+              <a:t>, A. and Friberg, A. “Algorithmic Composition of Popular Music,” in Proceedings of the 12th International Conference on Music Perception and Cognition and the 8th Triennial Conference of the European Society for the Cognitive Sciences of Music, July 2012, pp 276-285</a:t>
             </a:r>
           </a:p>
           <a:p>
@@ -2747,13 +2747,40 @@
               <a:buChar char="•"/>
             </a:pPr>
             <a:r>
-              <a:rPr lang="en-US" sz="1600" dirty="0">
+              <a:rPr lang="en-US" sz="1600" dirty="0" err="1">
                 <a:solidFill>
                   <a:schemeClr val="tx1"/>
                 </a:solidFill>
                 <a:latin typeface="Comfortaa" panose="020F0403060000060003" pitchFamily="34" charset="0"/>
               </a:rPr>
-              <a:t>Seabrook, Andrea (Host). 13 April, 2008. The Evolution of Video Game Music [All Things Considered]. https://www.npr.org/templates/story/story.php?storyId=89565567</a:t>
+              <a:t>Joutsenvirta</a:t>
+            </a:r>
+            <a:r>
+              <a:rPr lang="en-US" sz="1600" dirty="0">
+                <a:solidFill>
+                  <a:schemeClr val="tx1"/>
+                </a:solidFill>
+                <a:latin typeface="Comfortaa" panose="020F0403060000060003" pitchFamily="34" charset="0"/>
+              </a:rPr>
+              <a:t>, A. and </a:t>
+            </a:r>
+            <a:r>
+              <a:rPr lang="en-US" sz="1600" dirty="0" err="1">
+                <a:solidFill>
+                  <a:schemeClr val="tx1"/>
+                </a:solidFill>
+                <a:latin typeface="Comfortaa" panose="020F0403060000060003" pitchFamily="34" charset="0"/>
+              </a:rPr>
+              <a:t>Perkiömäki</a:t>
+            </a:r>
+            <a:r>
+              <a:rPr lang="en-US" sz="1600" dirty="0">
+                <a:solidFill>
+                  <a:schemeClr val="tx1"/>
+                </a:solidFill>
+                <a:latin typeface="Comfortaa" panose="020F0403060000060003" pitchFamily="34" charset="0"/>
+              </a:rPr>
+              <a:t>, J. “Intervals.” Music Theory, Sibelius Academy, www2.siba.fi/muste1/index.php?id=64&amp;la=en.</a:t>
             </a:r>
           </a:p>
           <a:p>
@@ -2761,12 +2788,63 @@
               <a:buFont typeface="Arial" panose="020B0604020202020204" pitchFamily="34" charset="0"/>
               <a:buChar char="•"/>
             </a:pPr>
-            <a:endParaRPr lang="en-US" sz="1600" dirty="0">
-              <a:solidFill>
-                <a:schemeClr val="tx1"/>
-              </a:solidFill>
-              <a:latin typeface="Comfortaa" panose="020F0403060000060003" pitchFamily="34" charset="0"/>
-            </a:endParaRPr>
+            <a:r>
+              <a:rPr lang="en-US" sz="1600" dirty="0">
+                <a:solidFill>
+                  <a:schemeClr val="tx1"/>
+                </a:solidFill>
+                <a:latin typeface="Comfortaa" panose="020F0403060000060003" pitchFamily="34" charset="0"/>
+              </a:rPr>
+              <a:t>Whalen, Zach. "Case Study: Film Music vs. Video game Music: The case of Silent Hill.“ 2007.</a:t>
+            </a:r>
+          </a:p>
+          <a:p>
+            <a:pPr marL="342900" indent="-342900">
+              <a:buFont typeface="Arial" panose="020B0604020202020204" pitchFamily="34" charset="0"/>
+              <a:buChar char="•"/>
+            </a:pPr>
+            <a:r>
+              <a:rPr lang="en-US" sz="1600" dirty="0">
+                <a:solidFill>
+                  <a:schemeClr val="tx1"/>
+                </a:solidFill>
+                <a:latin typeface="Comfortaa" panose="020F0403060000060003" pitchFamily="34" charset="0"/>
+              </a:rPr>
+              <a:t>Schulze, Walter, and Brink van der Merwe. “Music Generation With Markov Models.” </a:t>
+            </a:r>
+            <a:r>
+              <a:rPr lang="en-US" sz="1600" dirty="0" err="1">
+                <a:solidFill>
+                  <a:schemeClr val="tx1"/>
+                </a:solidFill>
+                <a:latin typeface="Comfortaa" panose="020F0403060000060003" pitchFamily="34" charset="0"/>
+              </a:rPr>
+              <a:t>Computingnow</a:t>
+            </a:r>
+            <a:r>
+              <a:rPr lang="en-US" sz="1600" dirty="0">
+                <a:solidFill>
+                  <a:schemeClr val="tx1"/>
+                </a:solidFill>
+                <a:latin typeface="Comfortaa" panose="020F0403060000060003" pitchFamily="34" charset="0"/>
+              </a:rPr>
+              <a:t>, 2011.</a:t>
+            </a:r>
+          </a:p>
+          <a:p>
+            <a:pPr marL="342900" indent="-342900">
+              <a:buFont typeface="Arial" panose="020B0604020202020204" pitchFamily="34" charset="0"/>
+              <a:buChar char="•"/>
+            </a:pPr>
+            <a:r>
+              <a:rPr lang="en-US" sz="1600" dirty="0">
+                <a:solidFill>
+                  <a:schemeClr val="tx1"/>
+                </a:solidFill>
+                <a:latin typeface="Comfortaa" panose="020F0403060000060003" pitchFamily="34" charset="0"/>
+              </a:rPr>
+              <a:t>Seabrook, Andrea (Host). 13 April, 2008. The Evolution of Video Game Music [All Things Considered]. https://www.npr.org/templates/story/story.php?storyId=89565567</a:t>
+            </a:r>
           </a:p>
         </p:txBody>
       </p:sp>
@@ -2947,7 +3025,7 @@
         </p:spPr>
         <p:txBody>
           <a:bodyPr>
-            <a:normAutofit fontScale="77500" lnSpcReduction="20000"/>
+            <a:normAutofit fontScale="70000" lnSpcReduction="20000"/>
           </a:bodyPr>
           <a:lstStyle/>
           <a:p>
@@ -2975,8 +3053,8 @@
         </p:nvSpPr>
         <p:spPr>
           <a:xfrm>
-            <a:off x="922338" y="479936"/>
-            <a:ext cx="42049700" cy="1637973"/>
+            <a:off x="1074187" y="514439"/>
+            <a:ext cx="42049700" cy="1391687"/>
           </a:xfrm>
         </p:spPr>
         <p:txBody>
@@ -3646,6 +3724,9 @@
           <a:solidFill>
             <a:srgbClr val="6600FF"/>
           </a:solidFill>
+          <a:ln>
+            <a:noFill/>
+          </a:ln>
         </p:spPr>
         <p:style>
           <a:lnRef idx="2">
@@ -3702,6 +3783,9 @@
           <a:solidFill>
             <a:srgbClr val="6600FF"/>
           </a:solidFill>
+          <a:ln>
+            <a:noFill/>
+          </a:ln>
         </p:spPr>
         <p:style>
           <a:lnRef idx="2">
@@ -8485,8 +8569,8 @@
           </a:p>
         </p:txBody>
       </p:sp>
-      <mc:AlternateContent xmlns:mc="http://schemas.openxmlformats.org/markup-compatibility/2006">
-        <mc:Choice xmlns:a14="http://schemas.microsoft.com/office/drawing/2010/main" Requires="a14">
+      <mc:AlternateContent xmlns:mc="http://schemas.openxmlformats.org/markup-compatibility/2006" xmlns:a14="http://schemas.microsoft.com/office/drawing/2010/main">
+        <mc:Choice Requires="a14">
           <p:sp>
             <p:nvSpPr>
               <p:cNvPr id="36" name="TextBox 35">
@@ -8669,7 +8753,7 @@
             </p:txBody>
           </p:sp>
         </mc:Choice>
-        <mc:Fallback>
+        <mc:Fallback xmlns="">
           <p:sp>
             <p:nvSpPr>
               <p:cNvPr id="36" name="TextBox 35">
@@ -9046,7 +9130,7 @@
         <p:spPr>
           <a:xfrm>
             <a:off x="33498396" y="20464310"/>
-            <a:ext cx="9678332" cy="3323987"/>
+            <a:ext cx="9678332" cy="2862322"/>
           </a:xfrm>
           <a:prstGeom prst="rect">
             <a:avLst/>
@@ -9078,7 +9162,7 @@
               <a:rPr lang="en-US" sz="3000" dirty="0">
                 <a:latin typeface="Comfortaa" panose="020F0403060000060003" pitchFamily="34" charset="0"/>
               </a:rPr>
-              <a:t>Generating video game music in real time along with gameplay</a:t>
+              <a:t>Integrating generated game music with gameplay</a:t>
             </a:r>
           </a:p>
           <a:p>
@@ -9124,7 +9208,7 @@
         </p:nvSpPr>
         <p:spPr>
           <a:xfrm>
-            <a:off x="32955305" y="23906469"/>
+            <a:off x="33011749" y="23389479"/>
             <a:ext cx="10045700" cy="738656"/>
           </a:xfrm>
           <a:prstGeom prst="rect">
@@ -9302,7 +9386,7 @@
         </p:nvSpPr>
         <p:spPr>
           <a:xfrm>
-            <a:off x="33498396" y="24751748"/>
+            <a:off x="33554840" y="24234758"/>
             <a:ext cx="9456674" cy="1477328"/>
           </a:xfrm>
           <a:prstGeom prst="rect">
@@ -9353,78 +9437,6 @@
           </a:p>
         </p:txBody>
       </p:sp>
-      <p:pic>
-        <p:nvPicPr>
-          <p:cNvPr id="28" name="Picture 27">
-            <a:extLst>
-              <a:ext uri="{FF2B5EF4-FFF2-40B4-BE49-F238E27FC236}">
-                <a16:creationId xmlns:a16="http://schemas.microsoft.com/office/drawing/2014/main" id="{9C7334E7-C203-4AF9-BF34-1B7AE41E3BC3}"/>
-              </a:ext>
-            </a:extLst>
-          </p:cNvPr>
-          <p:cNvPicPr>
-            <a:picLocks noChangeAspect="1"/>
-          </p:cNvPicPr>
-          <p:nvPr/>
-        </p:nvPicPr>
-        <p:blipFill>
-          <a:blip r:embed="rId13">
-            <a:extLst>
-              <a:ext uri="{28A0092B-C50C-407E-A947-70E740481C1C}">
-                <a14:useLocalDpi xmlns:a14="http://schemas.microsoft.com/office/drawing/2010/main" val="0"/>
-              </a:ext>
-            </a:extLst>
-          </a:blip>
-          <a:stretch>
-            <a:fillRect/>
-          </a:stretch>
-        </p:blipFill>
-        <p:spPr>
-          <a:xfrm>
-            <a:off x="22581466" y="5522476"/>
-            <a:ext cx="10335170" cy="4209366"/>
-          </a:xfrm>
-          <a:prstGeom prst="rect">
-            <a:avLst/>
-          </a:prstGeom>
-        </p:spPr>
-      </p:pic>
-      <p:pic>
-        <p:nvPicPr>
-          <p:cNvPr id="32" name="Picture 31">
-            <a:extLst>
-              <a:ext uri="{FF2B5EF4-FFF2-40B4-BE49-F238E27FC236}">
-                <a16:creationId xmlns:a16="http://schemas.microsoft.com/office/drawing/2014/main" id="{7A929714-7DC7-4A7B-B071-5EBFB0B739FA}"/>
-              </a:ext>
-            </a:extLst>
-          </p:cNvPr>
-          <p:cNvPicPr>
-            <a:picLocks noChangeAspect="1"/>
-          </p:cNvPicPr>
-          <p:nvPr/>
-        </p:nvPicPr>
-        <p:blipFill>
-          <a:blip r:embed="rId14">
-            <a:extLst>
-              <a:ext uri="{28A0092B-C50C-407E-A947-70E740481C1C}">
-                <a14:useLocalDpi xmlns:a14="http://schemas.microsoft.com/office/drawing/2010/main" val="0"/>
-              </a:ext>
-            </a:extLst>
-          </a:blip>
-          <a:stretch>
-            <a:fillRect/>
-          </a:stretch>
-        </p:blipFill>
-        <p:spPr>
-          <a:xfrm>
-            <a:off x="22581465" y="14776893"/>
-            <a:ext cx="10335170" cy="4772126"/>
-          </a:xfrm>
-          <a:prstGeom prst="rect">
-            <a:avLst/>
-          </a:prstGeom>
-        </p:spPr>
-      </p:pic>
       <p:graphicFrame>
         <p:nvGraphicFramePr>
           <p:cNvPr id="38" name="Table 37">
@@ -9440,14 +9452,14 @@
           <p:nvPr>
             <p:extLst>
               <p:ext uri="{D42A27DB-BD31-4B8C-83A1-F6EECF244321}">
-                <p14:modId xmlns:p14="http://schemas.microsoft.com/office/powerpoint/2010/main" val="4017580475"/>
+                <p14:modId xmlns:p14="http://schemas.microsoft.com/office/powerpoint/2010/main" val="2047795166"/>
               </p:ext>
             </p:extLst>
           </p:nvPr>
         </p:nvGraphicFramePr>
         <p:xfrm>
-          <a:off x="22581466" y="24753305"/>
-          <a:ext cx="10243888" cy="6437298"/>
+          <a:off x="22800323" y="24815531"/>
+          <a:ext cx="9799477" cy="6375072"/>
         </p:xfrm>
         <a:graphic>
           <a:graphicData uri="http://schemas.openxmlformats.org/drawingml/2006/table">
@@ -9456,28 +9468,28 @@
                 <a:tableStyleId>{5940675A-B579-460E-94D1-54222C63F5DA}</a:tableStyleId>
               </a:tblPr>
               <a:tblGrid>
-                <a:gridCol w="2560972">
+                <a:gridCol w="2200745">
                   <a:extLst>
                     <a:ext uri="{9D8B030D-6E8A-4147-A177-3AD203B41FA5}">
                       <a16:colId xmlns:a16="http://schemas.microsoft.com/office/drawing/2014/main" val="1188776929"/>
                     </a:ext>
                   </a:extLst>
                 </a:gridCol>
-                <a:gridCol w="2560972">
+                <a:gridCol w="2593766">
                   <a:extLst>
                     <a:ext uri="{9D8B030D-6E8A-4147-A177-3AD203B41FA5}">
                       <a16:colId xmlns:a16="http://schemas.microsoft.com/office/drawing/2014/main" val="1906332854"/>
                     </a:ext>
                   </a:extLst>
                 </a:gridCol>
-                <a:gridCol w="2560972">
+                <a:gridCol w="2958870">
                   <a:extLst>
                     <a:ext uri="{9D8B030D-6E8A-4147-A177-3AD203B41FA5}">
                       <a16:colId xmlns:a16="http://schemas.microsoft.com/office/drawing/2014/main" val="1056691790"/>
                     </a:ext>
                   </a:extLst>
                 </a:gridCol>
-                <a:gridCol w="2560972">
+                <a:gridCol w="2046096">
                   <a:extLst>
                     <a:ext uri="{9D8B030D-6E8A-4147-A177-3AD203B41FA5}">
                       <a16:colId xmlns:a16="http://schemas.microsoft.com/office/drawing/2014/main" val="1475502363"/>
@@ -9485,14 +9497,14 @@
                   </a:extLst>
                 </a:gridCol>
               </a:tblGrid>
-              <a:tr h="919614">
+              <a:tr h="792482">
                 <a:tc>
                   <a:txBody>
                     <a:bodyPr/>
                     <a:lstStyle/>
                     <a:p>
                       <a:pPr algn="ctr" rtl="0" fontAlgn="b"/>
-                      <a:endParaRPr lang="en-US" sz="3000">
+                      <a:endParaRPr lang="en-US" sz="2800">
                         <a:effectLst/>
                         <a:latin typeface="Comfortaa" panose="020F0403060000060003"/>
                       </a:endParaRPr>
@@ -9509,7 +9521,7 @@
                     <a:p>
                       <a:pPr algn="ctr" rtl="0" fontAlgn="b"/>
                       <a:r>
-                        <a:rPr lang="en-US" sz="3000" dirty="0">
+                        <a:rPr lang="en-US" sz="2800" b="1" dirty="0">
                           <a:effectLst/>
                           <a:latin typeface="Comfortaa" panose="020F0403060000060003"/>
                         </a:rPr>
@@ -9528,7 +9540,7 @@
                     <a:p>
                       <a:pPr algn="ctr" rtl="0" fontAlgn="b"/>
                       <a:r>
-                        <a:rPr lang="en-US" sz="3000">
+                        <a:rPr lang="en-US" sz="2800" b="1" dirty="0">
                           <a:effectLst/>
                           <a:latin typeface="Comfortaa" panose="020F0403060000060003"/>
                         </a:rPr>
@@ -9547,7 +9559,7 @@
                     <a:p>
                       <a:pPr algn="ctr" rtl="0" fontAlgn="b"/>
                       <a:r>
-                        <a:rPr lang="en-US" sz="3000">
+                        <a:rPr lang="en-US" sz="2800" b="1" dirty="0">
                           <a:effectLst/>
                           <a:latin typeface="Comfortaa" panose="020F0403060000060003"/>
                         </a:rPr>
@@ -9565,7 +9577,7 @@
                   </a:ext>
                 </a:extLst>
               </a:tr>
-              <a:tr h="919614">
+              <a:tr h="816705">
                 <a:tc>
                   <a:txBody>
                     <a:bodyPr/>
@@ -9573,7 +9585,7 @@
                     <a:p>
                       <a:pPr algn="ctr" rtl="0" fontAlgn="b"/>
                       <a:r>
-                        <a:rPr lang="en-US" sz="3000" dirty="0">
+                        <a:rPr lang="en-US" sz="2800" dirty="0">
                           <a:effectLst/>
                           <a:latin typeface="Comfortaa" panose="020F0403060000060003"/>
                         </a:rPr>
@@ -9592,7 +9604,7 @@
                     <a:p>
                       <a:pPr algn="ctr" rtl="0" fontAlgn="b"/>
                       <a:r>
-                        <a:rPr lang="en-US" sz="3000" dirty="0">
+                        <a:rPr lang="en-US" sz="2800" dirty="0">
                           <a:effectLst/>
                           <a:latin typeface="Comfortaa" panose="020F0403060000060003"/>
                         </a:rPr>
@@ -9611,7 +9623,7 @@
                     <a:p>
                       <a:pPr algn="ctr" rtl="0" fontAlgn="b"/>
                       <a:r>
-                        <a:rPr lang="en-US" sz="3000">
+                        <a:rPr lang="en-US" sz="2800" dirty="0">
                           <a:effectLst/>
                           <a:latin typeface="Comfortaa" panose="020F0403060000060003"/>
                         </a:rPr>
@@ -9630,7 +9642,7 @@
                     <a:p>
                       <a:pPr algn="ctr" rtl="0" fontAlgn="b"/>
                       <a:r>
-                        <a:rPr lang="en-US" sz="3000">
+                        <a:rPr lang="en-US" sz="2800" dirty="0">
                           <a:effectLst/>
                           <a:latin typeface="Comfortaa" panose="020F0403060000060003"/>
                         </a:rPr>
@@ -9648,7 +9660,7 @@
                   </a:ext>
                 </a:extLst>
               </a:tr>
-              <a:tr h="919614">
+              <a:tr h="1222742">
                 <a:tc>
                   <a:txBody>
                     <a:bodyPr/>
@@ -9656,7 +9668,7 @@
                     <a:p>
                       <a:pPr algn="ctr" rtl="0" fontAlgn="b"/>
                       <a:r>
-                        <a:rPr lang="en-US" sz="3000">
+                        <a:rPr lang="en-US" sz="2800">
                           <a:effectLst/>
                           <a:latin typeface="Comfortaa" panose="020F0403060000060003"/>
                         </a:rPr>
@@ -9675,7 +9687,7 @@
                     <a:p>
                       <a:pPr algn="ctr" rtl="0" fontAlgn="b"/>
                       <a:r>
-                        <a:rPr lang="en-US" sz="3000">
+                        <a:rPr lang="en-US" sz="2800">
                           <a:effectLst/>
                           <a:latin typeface="Comfortaa" panose="020F0403060000060003"/>
                         </a:rPr>
@@ -9694,7 +9706,7 @@
                     <a:p>
                       <a:pPr algn="ctr" rtl="0" fontAlgn="b"/>
                       <a:r>
-                        <a:rPr lang="en-US" sz="3000" dirty="0">
+                        <a:rPr lang="en-US" sz="2800" dirty="0">
                           <a:effectLst/>
                           <a:latin typeface="Comfortaa" panose="020F0403060000060003"/>
                         </a:rPr>
@@ -9713,7 +9725,7 @@
                     <a:p>
                       <a:pPr algn="ctr" rtl="0" fontAlgn="b"/>
                       <a:r>
-                        <a:rPr lang="en-US" sz="3000">
+                        <a:rPr lang="en-US" sz="2800" dirty="0">
                           <a:effectLst/>
                           <a:latin typeface="Comfortaa" panose="020F0403060000060003"/>
                         </a:rPr>
@@ -9731,7 +9743,7 @@
                   </a:ext>
                 </a:extLst>
               </a:tr>
-              <a:tr h="919614">
+              <a:tr h="1222742">
                 <a:tc>
                   <a:txBody>
                     <a:bodyPr/>
@@ -9739,7 +9751,7 @@
                     <a:p>
                       <a:pPr algn="ctr" rtl="0" fontAlgn="b"/>
                       <a:r>
-                        <a:rPr lang="en-US" sz="3000" dirty="0">
+                        <a:rPr lang="en-US" sz="2800" dirty="0">
                           <a:effectLst/>
                           <a:latin typeface="Comfortaa" panose="020F0403060000060003"/>
                         </a:rPr>
@@ -9748,7 +9760,12 @@
                     </a:p>
                   </a:txBody>
                   <a:tcPr marL="3910" marR="3910" marT="2607" marB="2607" anchor="ctr">
-                    <a:noFill/>
+                    <a:solidFill>
+                      <a:schemeClr val="accent4">
+                        <a:lumMod val="40000"/>
+                        <a:lumOff val="60000"/>
+                      </a:schemeClr>
+                    </a:solidFill>
                   </a:tcPr>
                 </a:tc>
                 <a:tc>
@@ -9758,7 +9775,7 @@
                     <a:p>
                       <a:pPr algn="ctr" rtl="0" fontAlgn="b"/>
                       <a:r>
-                        <a:rPr lang="en-US" sz="3000" dirty="0">
+                        <a:rPr lang="en-US" sz="2800" dirty="0">
                           <a:effectLst/>
                           <a:latin typeface="Comfortaa" panose="020F0403060000060003"/>
                         </a:rPr>
@@ -9767,7 +9784,12 @@
                     </a:p>
                   </a:txBody>
                   <a:tcPr marL="3910" marR="3910" marT="2607" marB="2607" anchor="ctr">
-                    <a:noFill/>
+                    <a:solidFill>
+                      <a:schemeClr val="accent4">
+                        <a:lumMod val="40000"/>
+                        <a:lumOff val="60000"/>
+                      </a:schemeClr>
+                    </a:solidFill>
                   </a:tcPr>
                 </a:tc>
                 <a:tc>
@@ -9777,7 +9799,7 @@
                     <a:p>
                       <a:pPr algn="ctr" rtl="0" fontAlgn="b"/>
                       <a:r>
-                        <a:rPr lang="en-US" sz="3000">
+                        <a:rPr lang="en-US" sz="2800" dirty="0">
                           <a:effectLst/>
                           <a:latin typeface="Comfortaa" panose="020F0403060000060003"/>
                         </a:rPr>
@@ -9786,7 +9808,12 @@
                     </a:p>
                   </a:txBody>
                   <a:tcPr marL="3910" marR="3910" marT="2607" marB="2607" anchor="ctr">
-                    <a:noFill/>
+                    <a:solidFill>
+                      <a:schemeClr val="accent4">
+                        <a:lumMod val="40000"/>
+                        <a:lumOff val="60000"/>
+                      </a:schemeClr>
+                    </a:solidFill>
                   </a:tcPr>
                 </a:tc>
                 <a:tc>
@@ -9796,7 +9823,7 @@
                     <a:p>
                       <a:pPr algn="ctr" rtl="0" fontAlgn="b"/>
                       <a:r>
-                        <a:rPr lang="en-US" sz="3000">
+                        <a:rPr lang="en-US" sz="2800" dirty="0">
                           <a:effectLst/>
                           <a:latin typeface="Comfortaa" panose="020F0403060000060003"/>
                         </a:rPr>
@@ -9805,7 +9832,12 @@
                     </a:p>
                   </a:txBody>
                   <a:tcPr marL="3910" marR="3910" marT="2607" marB="2607" anchor="ctr">
-                    <a:noFill/>
+                    <a:solidFill>
+                      <a:schemeClr val="accent4">
+                        <a:lumMod val="40000"/>
+                        <a:lumOff val="60000"/>
+                      </a:schemeClr>
+                    </a:solidFill>
                   </a:tcPr>
                 </a:tc>
                 <a:extLst>
@@ -9814,7 +9846,7 @@
                   </a:ext>
                 </a:extLst>
               </a:tr>
-              <a:tr h="919614">
+              <a:tr h="816705">
                 <a:tc>
                   <a:txBody>
                     <a:bodyPr/>
@@ -9822,7 +9854,7 @@
                     <a:p>
                       <a:pPr algn="ctr" rtl="0" fontAlgn="b"/>
                       <a:r>
-                        <a:rPr lang="en-US" sz="3000">
+                        <a:rPr lang="en-US" sz="2800">
                           <a:effectLst/>
                           <a:latin typeface="Comfortaa" panose="020F0403060000060003"/>
                         </a:rPr>
@@ -9841,7 +9873,7 @@
                     <a:p>
                       <a:pPr algn="ctr" rtl="0" fontAlgn="b"/>
                       <a:r>
-                        <a:rPr lang="en-US" sz="3000">
+                        <a:rPr lang="en-US" sz="2800">
                           <a:effectLst/>
                           <a:latin typeface="Comfortaa" panose="020F0403060000060003"/>
                         </a:rPr>
@@ -9860,7 +9892,7 @@
                     <a:p>
                       <a:pPr algn="ctr" rtl="0" fontAlgn="b"/>
                       <a:r>
-                        <a:rPr lang="en-US" sz="3000">
+                        <a:rPr lang="en-US" sz="2800" dirty="0">
                           <a:effectLst/>
                           <a:latin typeface="Comfortaa" panose="020F0403060000060003"/>
                         </a:rPr>
@@ -9879,7 +9911,7 @@
                     <a:p>
                       <a:pPr algn="ctr" rtl="0" fontAlgn="b"/>
                       <a:r>
-                        <a:rPr lang="en-US" sz="3000">
+                        <a:rPr lang="en-US" sz="2800" dirty="0">
                           <a:effectLst/>
                           <a:latin typeface="Comfortaa" panose="020F0403060000060003"/>
                         </a:rPr>
@@ -9897,7 +9929,7 @@
                   </a:ext>
                 </a:extLst>
               </a:tr>
-              <a:tr h="919614">
+              <a:tr h="678583">
                 <a:tc>
                   <a:txBody>
                     <a:bodyPr/>
@@ -9905,7 +9937,7 @@
                     <a:p>
                       <a:pPr algn="ctr" rtl="0" fontAlgn="b"/>
                       <a:r>
-                        <a:rPr lang="en-US" sz="3000">
+                        <a:rPr lang="en-US" sz="2800">
                           <a:effectLst/>
                           <a:latin typeface="Comfortaa" panose="020F0403060000060003"/>
                         </a:rPr>
@@ -9924,7 +9956,7 @@
                     <a:p>
                       <a:pPr algn="ctr" rtl="0" fontAlgn="b"/>
                       <a:r>
-                        <a:rPr lang="en-US" sz="3000" dirty="0">
+                        <a:rPr lang="en-US" sz="2800" dirty="0">
                           <a:effectLst/>
                           <a:latin typeface="Comfortaa" panose="020F0403060000060003"/>
                         </a:rPr>
@@ -9943,7 +9975,7 @@
                     <a:p>
                       <a:pPr algn="ctr" rtl="0" fontAlgn="b"/>
                       <a:r>
-                        <a:rPr lang="en-US" sz="3000" dirty="0">
+                        <a:rPr lang="en-US" sz="2800" dirty="0">
                           <a:effectLst/>
                           <a:latin typeface="Comfortaa" panose="020F0403060000060003"/>
                         </a:rPr>
@@ -9962,7 +9994,7 @@
                     <a:p>
                       <a:pPr algn="ctr" rtl="0" fontAlgn="b"/>
                       <a:r>
-                        <a:rPr lang="en-US" sz="3000" dirty="0">
+                        <a:rPr lang="en-US" sz="2800" dirty="0">
                           <a:effectLst/>
                           <a:latin typeface="Comfortaa" panose="020F0403060000060003"/>
                         </a:rPr>
@@ -9980,7 +10012,7 @@
                   </a:ext>
                 </a:extLst>
               </a:tr>
-              <a:tr h="919614">
+              <a:tr h="678583">
                 <a:tc>
                   <a:txBody>
                     <a:bodyPr/>
@@ -9988,7 +10020,7 @@
                     <a:p>
                       <a:pPr algn="ctr" rtl="0" fontAlgn="b"/>
                       <a:r>
-                        <a:rPr lang="en-US" sz="3000">
+                        <a:rPr lang="en-US" sz="2800" b="1" dirty="0">
                           <a:effectLst/>
                           <a:latin typeface="Comfortaa" panose="020F0403060000060003"/>
                         </a:rPr>
@@ -10007,7 +10039,7 @@
                     <a:p>
                       <a:pPr algn="ctr" rtl="0" fontAlgn="b"/>
                       <a:r>
-                        <a:rPr lang="en-US" sz="3000">
+                        <a:rPr lang="en-US" sz="2800" b="1">
                           <a:effectLst/>
                           <a:latin typeface="Comfortaa" panose="020F0403060000060003"/>
                         </a:rPr>
@@ -10026,7 +10058,7 @@
                     <a:p>
                       <a:pPr algn="ctr" rtl="0" fontAlgn="b"/>
                       <a:r>
-                        <a:rPr lang="en-US" sz="3000" dirty="0">
+                        <a:rPr lang="en-US" sz="2800" b="1" dirty="0">
                           <a:effectLst/>
                           <a:latin typeface="Comfortaa" panose="020F0403060000060003"/>
                         </a:rPr>
@@ -10045,7 +10077,7 @@
                     <a:p>
                       <a:pPr algn="ctr" rtl="0" fontAlgn="b"/>
                       <a:r>
-                        <a:rPr lang="en-US" sz="3000" dirty="0">
+                        <a:rPr lang="en-US" sz="2800" b="1" dirty="0">
                           <a:effectLst/>
                           <a:latin typeface="Comfortaa" panose="020F0403060000060003"/>
                         </a:rPr>
@@ -10083,7 +10115,7 @@
         </p:nvSpPr>
         <p:spPr>
           <a:xfrm>
-            <a:off x="22581466" y="23788297"/>
+            <a:off x="22581466" y="24053749"/>
             <a:ext cx="10045700" cy="800211"/>
           </a:xfrm>
           <a:prstGeom prst="rect">
@@ -10263,8 +10295,8 @@
         </p:nvSpPr>
         <p:spPr>
           <a:xfrm>
-            <a:off x="22927574" y="19606041"/>
-            <a:ext cx="9642952" cy="4431960"/>
+            <a:off x="22740890" y="20573771"/>
+            <a:ext cx="9642952" cy="3508631"/>
           </a:xfrm>
           <a:prstGeom prst="rect">
             <a:avLst/>
@@ -10425,7 +10457,7 @@
                 </a:solidFill>
                 <a:latin typeface="Comfortaa" panose="020F0403060000060003" pitchFamily="34" charset="0"/>
               </a:rPr>
-              <a:t>Speedup increases with problem size up to a point, then drastically drops</a:t>
+              <a:t>Speedup increases until 50,000 measures</a:t>
             </a:r>
           </a:p>
           <a:p>
@@ -10455,7 +10487,7 @@
                 </a:solidFill>
                 <a:latin typeface="Comfortaa" panose="020F0403060000060003" pitchFamily="34" charset="0"/>
               </a:rPr>
-              <a:t>Matrix loading dominates runtime for low number of measures</a:t>
+              <a:t>Matrix loading dominates for low # measures</a:t>
             </a:r>
           </a:p>
           <a:p>
@@ -10491,8 +10523,8 @@
         </p:nvSpPr>
         <p:spPr>
           <a:xfrm>
-            <a:off x="22984214" y="9838527"/>
-            <a:ext cx="9642952" cy="4985958"/>
+            <a:off x="22740890" y="10596476"/>
+            <a:ext cx="9642952" cy="4524293"/>
           </a:xfrm>
           <a:prstGeom prst="rect">
             <a:avLst/>
@@ -10668,7 +10700,7 @@
                 </a:solidFill>
                 <a:latin typeface="Comfortaa" panose="020F0403060000060003" pitchFamily="34" charset="0"/>
               </a:rPr>
-              <a:t>Speedup stays steady at around 4 over all data sets</a:t>
+              <a:t>Speedup stays steady at 4</a:t>
             </a:r>
           </a:p>
           <a:p>
@@ -10698,7 +10730,7 @@
                 </a:solidFill>
                 <a:latin typeface="Comfortaa" panose="020F0403060000060003" pitchFamily="34" charset="0"/>
               </a:rPr>
-              <a:t>CPU-GPU transfer times dominate performance in most data set sizes</a:t>
+              <a:t>CPU-GPU transfer times dominate performance</a:t>
             </a:r>
           </a:p>
           <a:p>
@@ -10713,11 +10745,99 @@
                 </a:solidFill>
                 <a:latin typeface="Comfortaa" panose="020F0403060000060003" pitchFamily="34" charset="0"/>
               </a:rPr>
-              <a:t>Optimizations for asynchronous memory copy operations, multiple GPU usage, contiguous row split</a:t>
+              <a:t>Optimizations for </a:t>
+            </a:r>
+            <a:r>
+              <a:rPr lang="en-US" sz="3000" dirty="0" err="1">
+                <a:solidFill>
+                  <a:schemeClr val="tx1"/>
+                </a:solidFill>
+                <a:latin typeface="Comfortaa" panose="020F0403060000060003" pitchFamily="34" charset="0"/>
+              </a:rPr>
+              <a:t>async</a:t>
+            </a:r>
+            <a:r>
+              <a:rPr lang="en-US" sz="3000" dirty="0">
+                <a:solidFill>
+                  <a:schemeClr val="tx1"/>
+                </a:solidFill>
+                <a:latin typeface="Comfortaa" panose="020F0403060000060003" pitchFamily="34" charset="0"/>
+              </a:rPr>
+              <a:t> memory copy operations, multiple GPU usage, matrix block divisions</a:t>
             </a:r>
           </a:p>
         </p:txBody>
       </p:sp>
+      <p:pic>
+        <p:nvPicPr>
+          <p:cNvPr id="30" name="Picture 29" descr="A close up of a map&#10;&#10;Description generated with very high confidence">
+            <a:extLst>
+              <a:ext uri="{FF2B5EF4-FFF2-40B4-BE49-F238E27FC236}">
+                <a16:creationId xmlns:a16="http://schemas.microsoft.com/office/drawing/2014/main" id="{3F7804EA-DF0E-40C8-82D9-729C13C1B131}"/>
+              </a:ext>
+            </a:extLst>
+          </p:cNvPr>
+          <p:cNvPicPr>
+            <a:picLocks noChangeAspect="1"/>
+          </p:cNvPicPr>
+          <p:nvPr/>
+        </p:nvPicPr>
+        <p:blipFill rotWithShape="1">
+          <a:blip r:embed="rId13" cstate="print">
+            <a:extLst>
+              <a:ext uri="{28A0092B-C50C-407E-A947-70E740481C1C}">
+                <a14:useLocalDpi xmlns:a14="http://schemas.microsoft.com/office/drawing/2010/main" val="0"/>
+              </a:ext>
+            </a:extLst>
+          </a:blip>
+          <a:srcRect l="7335" r="7329"/>
+          <a:stretch/>
+        </p:blipFill>
+        <p:spPr>
+          <a:xfrm>
+            <a:off x="22893890" y="15239785"/>
+            <a:ext cx="9332128" cy="5425791"/>
+          </a:xfrm>
+          <a:prstGeom prst="rect">
+            <a:avLst/>
+          </a:prstGeom>
+        </p:spPr>
+      </p:pic>
+      <p:pic>
+        <p:nvPicPr>
+          <p:cNvPr id="39" name="Picture 38" descr="A close up of a map&#10;&#10;Description generated with high confidence">
+            <a:extLst>
+              <a:ext uri="{FF2B5EF4-FFF2-40B4-BE49-F238E27FC236}">
+                <a16:creationId xmlns:a16="http://schemas.microsoft.com/office/drawing/2014/main" id="{EAE30849-32A9-4CBD-86A6-022657735F38}"/>
+              </a:ext>
+            </a:extLst>
+          </p:cNvPr>
+          <p:cNvPicPr>
+            <a:picLocks noChangeAspect="1"/>
+          </p:cNvPicPr>
+          <p:nvPr/>
+        </p:nvPicPr>
+        <p:blipFill rotWithShape="1">
+          <a:blip r:embed="rId14" cstate="print">
+            <a:extLst>
+              <a:ext uri="{28A0092B-C50C-407E-A947-70E740481C1C}">
+                <a14:useLocalDpi xmlns:a14="http://schemas.microsoft.com/office/drawing/2010/main" val="0"/>
+              </a:ext>
+            </a:extLst>
+          </a:blip>
+          <a:srcRect l="5208" r="7758"/>
+          <a:stretch/>
+        </p:blipFill>
+        <p:spPr>
+          <a:xfrm>
+            <a:off x="22800324" y="5405404"/>
+            <a:ext cx="9212559" cy="5334377"/>
+          </a:xfrm>
+          <a:prstGeom prst="rect">
+            <a:avLst/>
+          </a:prstGeom>
+        </p:spPr>
+      </p:pic>
     </p:spTree>
     <p:extLst>
       <p:ext uri="{BB962C8B-B14F-4D97-AF65-F5344CB8AC3E}">

</xml_diff>